<commit_message>
fleshing out results for periodic system analysis
</commit_message>
<xml_diff>
--- a/thesis/Defense.pptx
+++ b/thesis/Defense.pptx
@@ -869,26 +869,8 @@
           <a:lstStyle/>
           <a:p>
             <a:r>
-              <a:rPr lang="en-US" dirty="0" smtClean="0"/>
-              <a:t>2 component-based applications (shades of blue) split across 4 nodes in a cluster </a:t>
-            </a:r>
-          </a:p>
-          <a:p>
-            <a:endParaRPr lang="en-US" dirty="0" smtClean="0"/>
-          </a:p>
-          <a:p>
-            <a:r>
-              <a:rPr lang="en-US" dirty="0" smtClean="0"/>
-              <a:t>Apps communicate with each other</a:t>
-            </a:r>
-          </a:p>
-          <a:p>
-            <a:endParaRPr lang="en-US" dirty="0" smtClean="0"/>
-          </a:p>
-          <a:p>
-            <a:r>
-              <a:rPr lang="en-US" dirty="0" smtClean="0"/>
-              <a:t>All port traffic flows on the network</a:t>
+              <a:rPr lang="en-US" baseline="0" dirty="0" smtClean="0"/>
+              <a:t>Don’t get into depth about CPN or anything</a:t>
             </a:r>
             <a:endParaRPr lang="en-US" dirty="0"/>
           </a:p>
@@ -912,7 +894,7 @@
             <a:fld id="{BF235529-9E21-485D-85D0-B510246CE809}" type="slidenum">
               <a:rPr lang="en-US" smtClean="0"/>
               <a:pPr/>
-              <a:t>22</a:t>
+              <a:t>21</a:t>
             </a:fld>
             <a:endParaRPr lang="en-US"/>
           </a:p>
@@ -921,7 +903,7 @@
     </p:spTree>
     <p:extLst>
       <p:ext uri="{BB962C8B-B14F-4D97-AF65-F5344CB8AC3E}">
-        <p14:creationId xmlns:p14="http://schemas.microsoft.com/office/powerpoint/2010/main" val="101021381"/>
+        <p14:creationId xmlns:p14="http://schemas.microsoft.com/office/powerpoint/2010/main" val="1242748954"/>
       </p:ext>
     </p:extLst>
   </p:cSld>
@@ -976,8 +958,26 @@
           <a:lstStyle/>
           <a:p>
             <a:r>
-              <a:rPr lang="en-US" baseline="0" dirty="0" smtClean="0"/>
-              <a:t>Don’t get into depth about CPN or anything</a:t>
+              <a:rPr lang="en-US" dirty="0" smtClean="0"/>
+              <a:t>2 component-based applications (shades of blue) split across 4 nodes in a cluster </a:t>
+            </a:r>
+          </a:p>
+          <a:p>
+            <a:endParaRPr lang="en-US" dirty="0" smtClean="0"/>
+          </a:p>
+          <a:p>
+            <a:r>
+              <a:rPr lang="en-US" dirty="0" smtClean="0"/>
+              <a:t>Apps communicate with each other</a:t>
+            </a:r>
+          </a:p>
+          <a:p>
+            <a:endParaRPr lang="en-US" dirty="0" smtClean="0"/>
+          </a:p>
+          <a:p>
+            <a:r>
+              <a:rPr lang="en-US" dirty="0" smtClean="0"/>
+              <a:t>All port traffic flows on the network</a:t>
             </a:r>
             <a:endParaRPr lang="en-US" dirty="0"/>
           </a:p>
@@ -1001,7 +1001,7 @@
             <a:fld id="{BF235529-9E21-485D-85D0-B510246CE809}" type="slidenum">
               <a:rPr lang="en-US" smtClean="0"/>
               <a:pPr/>
-              <a:t>23</a:t>
+              <a:t>22</a:t>
             </a:fld>
             <a:endParaRPr lang="en-US"/>
           </a:p>
@@ -1064,6 +1064,95 @@
           <a:bodyPr/>
           <a:lstStyle/>
           <a:p>
+            <a:r>
+              <a:rPr lang="en-US" baseline="0" dirty="0" smtClean="0"/>
+              <a:t>Don’t get into depth about CPN or anything</a:t>
+            </a:r>
+            <a:endParaRPr lang="en-US" dirty="0"/>
+          </a:p>
+        </p:txBody>
+      </p:sp>
+      <p:sp>
+        <p:nvSpPr>
+          <p:cNvPr id="4" name="Slide Number Placeholder 3"/>
+          <p:cNvSpPr>
+            <a:spLocks noGrp="1"/>
+          </p:cNvSpPr>
+          <p:nvPr>
+            <p:ph type="sldNum" sz="quarter" idx="10"/>
+          </p:nvPr>
+        </p:nvSpPr>
+        <p:spPr/>
+        <p:txBody>
+          <a:bodyPr/>
+          <a:lstStyle/>
+          <a:p>
+            <a:fld id="{BF235529-9E21-485D-85D0-B510246CE809}" type="slidenum">
+              <a:rPr lang="en-US" smtClean="0"/>
+              <a:pPr/>
+              <a:t>23</a:t>
+            </a:fld>
+            <a:endParaRPr lang="en-US"/>
+          </a:p>
+        </p:txBody>
+      </p:sp>
+    </p:spTree>
+    <p:extLst>
+      <p:ext uri="{BB962C8B-B14F-4D97-AF65-F5344CB8AC3E}">
+        <p14:creationId xmlns:p14="http://schemas.microsoft.com/office/powerpoint/2010/main" val="101021381"/>
+      </p:ext>
+    </p:extLst>
+  </p:cSld>
+  <p:clrMapOvr>
+    <a:masterClrMapping/>
+  </p:clrMapOvr>
+</p:notes>
+</file>
+
+<file path=ppt/notesSlides/notesSlide13.xml><?xml version="1.0" encoding="utf-8"?>
+<p:notes xmlns:a="http://schemas.openxmlformats.org/drawingml/2006/main" xmlns:r="http://schemas.openxmlformats.org/officeDocument/2006/relationships" xmlns:p="http://schemas.openxmlformats.org/presentationml/2006/main">
+  <p:cSld>
+    <p:spTree>
+      <p:nvGrpSpPr>
+        <p:cNvPr id="1" name=""/>
+        <p:cNvGrpSpPr/>
+        <p:nvPr/>
+      </p:nvGrpSpPr>
+      <p:grpSpPr>
+        <a:xfrm>
+          <a:off x="0" y="0"/>
+          <a:ext cx="0" cy="0"/>
+          <a:chOff x="0" y="0"/>
+          <a:chExt cx="0" cy="0"/>
+        </a:xfrm>
+      </p:grpSpPr>
+      <p:sp>
+        <p:nvSpPr>
+          <p:cNvPr id="2" name="Slide Image Placeholder 1"/>
+          <p:cNvSpPr>
+            <a:spLocks noGrp="1" noRot="1" noChangeAspect="1"/>
+          </p:cNvSpPr>
+          <p:nvPr>
+            <p:ph type="sldImg"/>
+          </p:nvPr>
+        </p:nvSpPr>
+        <p:spPr/>
+      </p:sp>
+      <p:sp>
+        <p:nvSpPr>
+          <p:cNvPr id="3" name="Notes Placeholder 2"/>
+          <p:cNvSpPr>
+            <a:spLocks noGrp="1"/>
+          </p:cNvSpPr>
+          <p:nvPr>
+            <p:ph type="body" idx="1"/>
+          </p:nvPr>
+        </p:nvSpPr>
+        <p:spPr/>
+        <p:txBody>
+          <a:bodyPr/>
+          <a:lstStyle/>
+          <a:p>
             <a:endParaRPr lang="en-US" dirty="0"/>
           </a:p>
         </p:txBody>
@@ -1105,7 +1194,7 @@
 </p:notes>
 </file>
 
-<file path=ppt/notesSlides/notesSlide13.xml><?xml version="1.0" encoding="utf-8"?>
+<file path=ppt/notesSlides/notesSlide14.xml><?xml version="1.0" encoding="utf-8"?>
 <p:notes xmlns:a="http://schemas.openxmlformats.org/drawingml/2006/main" xmlns:r="http://schemas.openxmlformats.org/officeDocument/2006/relationships" xmlns:p="http://schemas.openxmlformats.org/presentationml/2006/main">
   <p:cSld>
     <p:spTree>
@@ -2374,28 +2463,90 @@
           <a:bodyPr/>
           <a:lstStyle/>
           <a:p>
-            <a:r>
-              <a:rPr lang="en-US" dirty="0" smtClean="0"/>
-              <a:t>Need to mention how we measure buffer space requirements: using Linux’s built-in measurement tools</a:t>
-            </a:r>
-          </a:p>
-          <a:p>
+            <a:pPr marL="171450" marR="0" lvl="1" indent="-171450" algn="l" defTabSz="914400" rtl="0" eaLnBrk="1" fontAlgn="auto" latinLnBrk="0" hangingPunct="1">
+              <a:lnSpc>
+                <a:spcPct val="100000"/>
+              </a:lnSpc>
+              <a:spcBef>
+                <a:spcPts val="0"/>
+              </a:spcBef>
+              <a:spcAft>
+                <a:spcPts val="0"/>
+              </a:spcAft>
+              <a:buClrTx/>
+              <a:buSzTx/>
+              <a:buFont typeface="Arial" panose="020B0604020202020204" pitchFamily="34" charset="0"/>
+              <a:buChar char="•"/>
+              <a:tabLst/>
+              <a:defRPr/>
+            </a:pPr>
+            <a:r>
+              <a:rPr lang="en-US" dirty="0" smtClean="0"/>
+              <a:t>the remaining capacity of the system at the end of the </a:t>
+            </a:r>
+            <a:r>
+              <a:rPr lang="en-US" dirty="0" err="1" smtClean="0"/>
+              <a:t>hyperperiod</a:t>
+            </a:r>
+            <a:r>
+              <a:rPr lang="en-US" dirty="0" smtClean="0"/>
+              <a:t> is less than the amount of data in the buffer at the end of the period</a:t>
+            </a:r>
+          </a:p>
+          <a:p>
+            <a:pPr marL="171450" marR="0" lvl="1" indent="-171450" algn="l" defTabSz="914400" rtl="0" eaLnBrk="1" fontAlgn="auto" latinLnBrk="0" hangingPunct="1">
+              <a:lnSpc>
+                <a:spcPct val="100000"/>
+              </a:lnSpc>
+              <a:spcBef>
+                <a:spcPts val="0"/>
+              </a:spcBef>
+              <a:spcAft>
+                <a:spcPts val="0"/>
+              </a:spcAft>
+              <a:buClrTx/>
+              <a:buSzTx/>
+              <a:buFont typeface="Arial" panose="020B0604020202020204" pitchFamily="34" charset="0"/>
+              <a:buChar char="•"/>
+              <a:tabLst/>
+              <a:defRPr/>
+            </a:pPr>
             <a:endParaRPr lang="en-US" dirty="0" smtClean="0"/>
           </a:p>
           <a:p>
-            <a:r>
-              <a:rPr lang="en-US" dirty="0" smtClean="0"/>
-              <a:t>Model same application with RTC and </a:t>
-            </a:r>
-            <a:r>
-              <a:rPr lang="en-US" dirty="0" smtClean="0"/>
-              <a:t>PNP</a:t>
-            </a:r>
-            <a:r>
-              <a:rPr lang="en-US" baseline="30000" dirty="0" smtClean="0"/>
-              <a:t>2</a:t>
+            <a:pPr marL="171450" marR="0" lvl="1" indent="-171450" algn="l" defTabSz="914400" rtl="0" eaLnBrk="1" fontAlgn="auto" latinLnBrk="0" hangingPunct="1">
+              <a:lnSpc>
+                <a:spcPct val="100000"/>
+              </a:lnSpc>
+              <a:spcBef>
+                <a:spcPts val="0"/>
+              </a:spcBef>
+              <a:spcAft>
+                <a:spcPts val="0"/>
+              </a:spcAft>
+              <a:buClrTx/>
+              <a:buSzTx/>
+              <a:buFont typeface="Arial" panose="020B0604020202020204" pitchFamily="34" charset="0"/>
+              <a:buChar char="•"/>
+              <a:tabLst/>
+              <a:defRPr/>
+            </a:pPr>
+            <a:r>
+              <a:rPr lang="en-US" dirty="0" smtClean="0"/>
+              <a:t>In</a:t>
+            </a:r>
+            <a:r>
+              <a:rPr lang="en-US" baseline="0" dirty="0" smtClean="0"/>
+              <a:t> addition to the period’s required </a:t>
+            </a:r>
+            <a:r>
+              <a:rPr lang="en-US" baseline="0" dirty="0" err="1" smtClean="0"/>
+              <a:t>trafffic</a:t>
             </a:r>
             <a:endParaRPr lang="en-US" dirty="0" smtClean="0"/>
+          </a:p>
+          <a:p>
+            <a:endParaRPr lang="en-US" dirty="0"/>
           </a:p>
         </p:txBody>
       </p:sp>
@@ -2417,7 +2568,7 @@
             <a:fld id="{BF235529-9E21-485D-85D0-B510246CE809}" type="slidenum">
               <a:rPr lang="en-US" smtClean="0"/>
               <a:pPr/>
-              <a:t>20</a:t>
+              <a:t>18</a:t>
             </a:fld>
             <a:endParaRPr lang="en-US"/>
           </a:p>
@@ -2426,7 +2577,7 @@
     </p:spTree>
     <p:extLst>
       <p:ext uri="{BB962C8B-B14F-4D97-AF65-F5344CB8AC3E}">
-        <p14:creationId xmlns:p14="http://schemas.microsoft.com/office/powerpoint/2010/main" val="222063346"/>
+        <p14:creationId xmlns:p14="http://schemas.microsoft.com/office/powerpoint/2010/main" val="677231793"/>
       </p:ext>
     </p:extLst>
   </p:cSld>
@@ -2481,10 +2632,27 @@
           <a:lstStyle/>
           <a:p>
             <a:r>
-              <a:rPr lang="en-US" baseline="0" dirty="0" smtClean="0"/>
-              <a:t>Don’t get into depth about CPN or anything</a:t>
-            </a:r>
-            <a:endParaRPr lang="en-US" dirty="0"/>
+              <a:rPr lang="en-US" dirty="0" smtClean="0"/>
+              <a:t>Need to mention how we measure buffer space requirements: using Linux’s built-in measurement tools</a:t>
+            </a:r>
+          </a:p>
+          <a:p>
+            <a:endParaRPr lang="en-US" dirty="0" smtClean="0"/>
+          </a:p>
+          <a:p>
+            <a:r>
+              <a:rPr lang="en-US" dirty="0" smtClean="0"/>
+              <a:t>Model same application with RTC and </a:t>
+            </a:r>
+            <a:r>
+              <a:rPr lang="en-US" dirty="0" smtClean="0"/>
+              <a:t>PNP</a:t>
+            </a:r>
+            <a:r>
+              <a:rPr lang="en-US" baseline="30000" dirty="0" smtClean="0"/>
+              <a:t>2</a:t>
+            </a:r>
+            <a:endParaRPr lang="en-US" dirty="0" smtClean="0"/>
           </a:p>
         </p:txBody>
       </p:sp>
@@ -2506,7 +2674,7 @@
             <a:fld id="{BF235529-9E21-485D-85D0-B510246CE809}" type="slidenum">
               <a:rPr lang="en-US" smtClean="0"/>
               <a:pPr/>
-              <a:t>21</a:t>
+              <a:t>20</a:t>
             </a:fld>
             <a:endParaRPr lang="en-US"/>
           </a:p>
@@ -2515,7 +2683,7 @@
     </p:spTree>
     <p:extLst>
       <p:ext uri="{BB962C8B-B14F-4D97-AF65-F5344CB8AC3E}">
-        <p14:creationId xmlns:p14="http://schemas.microsoft.com/office/powerpoint/2010/main" val="1242748954"/>
+        <p14:creationId xmlns:p14="http://schemas.microsoft.com/office/powerpoint/2010/main" val="222063346"/>
       </p:ext>
     </p:extLst>
   </p:cSld>
@@ -8636,7 +8804,7 @@
                 <a:pPr lvl="1"/>
                 <a:r>
                   <a:rPr lang="en-US" dirty="0" smtClean="0"/>
-                  <a:t>Repeating functions result from integrating periodic functions; similarly they produce periodic functions when differentiated</a:t>
+                  <a:t>Repeating functions result from integrating periodic functions; they produce periodic functions when differentiated</a:t>
                 </a:r>
               </a:p>
               <a:p>
@@ -8995,31 +9163,12 @@
                 <a:pPr lvl="1"/>
                 <a14:m>
                   <m:oMath xmlns:m="http://schemas.openxmlformats.org/officeDocument/2006/math">
-                    <m:sSub>
-                      <m:sSubPr>
-                        <m:ctrlPr>
-                          <a:rPr lang="en-US" b="0" i="1" smtClean="0">
-                            <a:latin typeface="Cambria Math" panose="02040503050406030204" pitchFamily="18" charset="0"/>
-                          </a:rPr>
-                        </m:ctrlPr>
-                      </m:sSubPr>
-                      <m:e>
-                        <m:r>
-                          <a:rPr lang="en-US" b="0" i="1" smtClean="0">
-                            <a:latin typeface="Cambria Math" panose="02040503050406030204" pitchFamily="18" charset="0"/>
-                          </a:rPr>
-                          <m:t>𝑇</m:t>
-                        </m:r>
-                      </m:e>
-                      <m:sub>
-                        <m:r>
-                          <a:rPr lang="en-US" b="0" i="1" smtClean="0">
-                            <a:latin typeface="Cambria Math" panose="02040503050406030204" pitchFamily="18" charset="0"/>
-                          </a:rPr>
-                          <m:t>𝑝</m:t>
-                        </m:r>
-                      </m:sub>
-                    </m:sSub>
+                    <m:r>
+                      <a:rPr lang="en-US" b="0" i="1" smtClean="0">
+                        <a:latin typeface="Cambria Math" panose="02040503050406030204" pitchFamily="18" charset="0"/>
+                      </a:rPr>
+                      <m:t>𝑇</m:t>
+                    </m:r>
                   </m:oMath>
                 </a14:m>
                 <a:r>
@@ -9102,31 +9251,15 @@
                 </a:r>
                 <a14:m>
                   <m:oMath xmlns:m="http://schemas.openxmlformats.org/officeDocument/2006/math">
-                    <m:sSub>
-                      <m:sSubPr>
-                        <m:ctrlPr>
-                          <a:rPr lang="en-US" b="0" i="1" smtClean="0">
-                            <a:latin typeface="Cambria Math" panose="02040503050406030204" pitchFamily="18" charset="0"/>
-                          </a:rPr>
-                        </m:ctrlPr>
-                      </m:sSubPr>
-                      <m:e>
-                        <m:r>
-                          <a:rPr lang="en-US" b="0" i="1" smtClean="0">
-                            <a:latin typeface="Cambria Math" panose="02040503050406030204" pitchFamily="18" charset="0"/>
-                          </a:rPr>
-                          <m:t>𝑇</m:t>
-                        </m:r>
-                      </m:e>
-                      <m:sub>
-                        <m:r>
-                          <a:rPr lang="en-US" b="0" i="1" smtClean="0">
-                            <a:latin typeface="Cambria Math" panose="02040503050406030204" pitchFamily="18" charset="0"/>
-                          </a:rPr>
-                          <m:t>𝑃</m:t>
-                        </m:r>
-                      </m:sub>
-                    </m:sSub>
+                    <m:r>
+                      <m:rPr>
+                        <m:sty m:val="p"/>
+                      </m:rPr>
+                      <a:rPr lang="en-US" b="0" i="0" smtClean="0">
+                        <a:latin typeface="Cambria Math" panose="02040503050406030204" pitchFamily="18" charset="0"/>
+                      </a:rPr>
+                      <m:t>T</m:t>
+                    </m:r>
                     <m:r>
                       <a:rPr lang="en-US" b="0" i="0" smtClean="0">
                         <a:latin typeface="Cambria Math" panose="02040503050406030204" pitchFamily="18" charset="0"/>
@@ -9229,7 +9362,7 @@
               <a:blipFill>
                 <a:blip r:embed="rId2"/>
                 <a:stretch>
-                  <a:fillRect l="-189" t="-1120" r="-1134" b="-13025"/>
+                  <a:fillRect l="-189" t="-1120" r="-95" b="-12745"/>
                 </a:stretch>
               </a:blipFill>
             </p:spPr>
@@ -9333,27 +9466,1377 @@
           </a:p>
         </p:txBody>
       </p:sp>
-      <p:sp>
-        <p:nvSpPr>
-          <p:cNvPr id="3" name="Content Placeholder 2"/>
-          <p:cNvSpPr>
-            <a:spLocks noGrp="1"/>
-          </p:cNvSpPr>
-          <p:nvPr>
-            <p:ph idx="1"/>
-          </p:nvPr>
-        </p:nvSpPr>
-        <p:spPr/>
-        <p:txBody>
-          <a:bodyPr>
-            <a:normAutofit/>
-          </a:bodyPr>
-          <a:lstStyle/>
-          <a:p>
-            <a:endParaRPr lang="en-US" dirty="0" smtClean="0"/>
-          </a:p>
-        </p:txBody>
-      </p:sp>
+      <mc:AlternateContent xmlns:mc="http://schemas.openxmlformats.org/markup-compatibility/2006">
+        <mc:Choice xmlns:a14="http://schemas.microsoft.com/office/drawing/2010/main" Requires="a14">
+          <p:sp>
+            <p:nvSpPr>
+              <p:cNvPr id="3" name="Content Placeholder 2"/>
+              <p:cNvSpPr>
+                <a:spLocks noGrp="1"/>
+              </p:cNvSpPr>
+              <p:nvPr>
+                <p:ph idx="1"/>
+              </p:nvPr>
+            </p:nvSpPr>
+            <p:spPr/>
+            <p:txBody>
+              <a:bodyPr>
+                <a:noAutofit/>
+              </a:bodyPr>
+              <a:lstStyle/>
+              <a:p>
+                <a:r>
+                  <a:rPr lang="en-US" dirty="0" smtClean="0"/>
+                  <a:t>Consider the scenario when </a:t>
+                </a:r>
+                <a14:m>
+                  <m:oMath xmlns:m="http://schemas.openxmlformats.org/officeDocument/2006/math">
+                    <m:r>
+                      <a:rPr lang="en-US" b="0" i="1" smtClean="0">
+                        <a:latin typeface="Cambria Math" panose="02040503050406030204" pitchFamily="18" charset="0"/>
+                      </a:rPr>
+                      <m:t>𝑅</m:t>
+                    </m:r>
+                    <m:d>
+                      <m:dPr>
+                        <m:begChr m:val="["/>
+                        <m:endChr m:val="]"/>
+                        <m:ctrlPr>
+                          <a:rPr lang="en-US" b="0" i="1" smtClean="0">
+                            <a:latin typeface="Cambria Math" panose="02040503050406030204" pitchFamily="18" charset="0"/>
+                          </a:rPr>
+                        </m:ctrlPr>
+                      </m:dPr>
+                      <m:e>
+                        <m:r>
+                          <a:rPr lang="en-US" b="0" i="1" smtClean="0">
+                            <a:latin typeface="Cambria Math" panose="02040503050406030204" pitchFamily="18" charset="0"/>
+                          </a:rPr>
+                          <m:t>𝑇</m:t>
+                        </m:r>
+                      </m:e>
+                    </m:d>
+                    <m:r>
+                      <a:rPr lang="en-US" b="0" i="1" smtClean="0">
+                        <a:latin typeface="Cambria Math" panose="02040503050406030204" pitchFamily="18" charset="0"/>
+                      </a:rPr>
+                      <m:t>&lt;</m:t>
+                    </m:r>
+                    <m:r>
+                      <a:rPr lang="en-US" b="0" i="1" smtClean="0">
+                        <a:latin typeface="Cambria Math" panose="02040503050406030204" pitchFamily="18" charset="0"/>
+                      </a:rPr>
+                      <m:t>𝐵</m:t>
+                    </m:r>
+                    <m:r>
+                      <a:rPr lang="en-US" b="0" i="1" smtClean="0">
+                        <a:latin typeface="Cambria Math" panose="02040503050406030204" pitchFamily="18" charset="0"/>
+                      </a:rPr>
+                      <m:t>[</m:t>
+                    </m:r>
+                    <m:r>
+                      <a:rPr lang="en-US" b="0" i="1" smtClean="0">
+                        <a:latin typeface="Cambria Math" panose="02040503050406030204" pitchFamily="18" charset="0"/>
+                      </a:rPr>
+                      <m:t>𝑇</m:t>
+                    </m:r>
+                    <m:r>
+                      <a:rPr lang="en-US" b="0" i="1" smtClean="0">
+                        <a:latin typeface="Cambria Math" panose="02040503050406030204" pitchFamily="18" charset="0"/>
+                      </a:rPr>
+                      <m:t>]</m:t>
+                    </m:r>
+                  </m:oMath>
+                </a14:m>
+                <a:r>
+                  <a:rPr lang="en-US" dirty="0" smtClean="0"/>
+                  <a:t>, </a:t>
+                </a:r>
+              </a:p>
+              <a:p>
+                <a:pPr lvl="1"/>
+                <a14:m>
+                  <m:oMath xmlns:m="http://schemas.openxmlformats.org/officeDocument/2006/math">
+                    <m:r>
+                      <a:rPr lang="en-US" b="0" i="1" smtClean="0">
+                        <a:latin typeface="Cambria Math" panose="02040503050406030204" pitchFamily="18" charset="0"/>
+                      </a:rPr>
+                      <m:t>𝑅</m:t>
+                    </m:r>
+                    <m:r>
+                      <a:rPr lang="en-US" b="0" i="1" smtClean="0">
+                        <a:latin typeface="Cambria Math" panose="02040503050406030204" pitchFamily="18" charset="0"/>
+                      </a:rPr>
+                      <m:t>[</m:t>
+                    </m:r>
+                    <m:r>
+                      <a:rPr lang="en-US" b="0" i="1" smtClean="0">
+                        <a:latin typeface="Cambria Math" panose="02040503050406030204" pitchFamily="18" charset="0"/>
+                      </a:rPr>
+                      <m:t>𝑇</m:t>
+                    </m:r>
+                    <m:r>
+                      <a:rPr lang="en-US" b="0" i="1" smtClean="0">
+                        <a:latin typeface="Cambria Math" panose="02040503050406030204" pitchFamily="18" charset="0"/>
+                      </a:rPr>
+                      <m:t>]</m:t>
+                    </m:r>
+                  </m:oMath>
+                </a14:m>
+                <a:r>
+                  <a:rPr lang="en-US" dirty="0" smtClean="0"/>
+                  <a:t> is a measure of how much extra data the system can transmit in a given period</a:t>
+                </a:r>
+                <a:r>
+                  <a:rPr lang="en-US" dirty="0"/>
+                  <a:t>;</a:t>
+                </a:r>
+                <a:r>
+                  <a:rPr lang="en-US" dirty="0" smtClean="0"/>
+                  <a:t> </a:t>
+                </a:r>
+                <a:r>
+                  <a:rPr lang="en-US" dirty="0" smtClean="0"/>
+                  <a:t>not all of the data in the buffer will have been serviced by the end of the second period, therefore </a:t>
+                </a:r>
+                <a14:m>
+                  <m:oMath xmlns:m="http://schemas.openxmlformats.org/officeDocument/2006/math">
+                    <m:r>
+                      <a:rPr lang="en-US" b="0" i="1" smtClean="0">
+                        <a:latin typeface="Cambria Math" panose="02040503050406030204" pitchFamily="18" charset="0"/>
+                      </a:rPr>
+                      <m:t>𝐵</m:t>
+                    </m:r>
+                    <m:d>
+                      <m:dPr>
+                        <m:begChr m:val="["/>
+                        <m:endChr m:val="]"/>
+                        <m:ctrlPr>
+                          <a:rPr lang="en-US" b="0" i="1" smtClean="0">
+                            <a:latin typeface="Cambria Math" panose="02040503050406030204" pitchFamily="18" charset="0"/>
+                          </a:rPr>
+                        </m:ctrlPr>
+                      </m:dPr>
+                      <m:e>
+                        <m:r>
+                          <a:rPr lang="en-US" b="0" i="1" smtClean="0">
+                            <a:latin typeface="Cambria Math" panose="02040503050406030204" pitchFamily="18" charset="0"/>
+                          </a:rPr>
+                          <m:t>2∗</m:t>
+                        </m:r>
+                        <m:r>
+                          <a:rPr lang="en-US" b="0" i="1" smtClean="0">
+                            <a:latin typeface="Cambria Math" panose="02040503050406030204" pitchFamily="18" charset="0"/>
+                          </a:rPr>
+                          <m:t>𝑇</m:t>
+                        </m:r>
+                      </m:e>
+                    </m:d>
+                    <m:r>
+                      <a:rPr lang="en-US" b="0" i="1" smtClean="0">
+                        <a:latin typeface="Cambria Math" panose="02040503050406030204" pitchFamily="18" charset="0"/>
+                      </a:rPr>
+                      <m:t>&gt;</m:t>
+                    </m:r>
+                    <m:r>
+                      <a:rPr lang="en-US" b="0" i="1" smtClean="0">
+                        <a:latin typeface="Cambria Math" panose="02040503050406030204" pitchFamily="18" charset="0"/>
+                      </a:rPr>
+                      <m:t>𝐵</m:t>
+                    </m:r>
+                    <m:r>
+                      <a:rPr lang="en-US" b="0" i="1" smtClean="0">
+                        <a:latin typeface="Cambria Math" panose="02040503050406030204" pitchFamily="18" charset="0"/>
+                      </a:rPr>
+                      <m:t>[</m:t>
+                    </m:r>
+                    <m:r>
+                      <a:rPr lang="en-US" b="0" i="1" smtClean="0">
+                        <a:latin typeface="Cambria Math" panose="02040503050406030204" pitchFamily="18" charset="0"/>
+                      </a:rPr>
+                      <m:t>𝑇</m:t>
+                    </m:r>
+                    <m:r>
+                      <a:rPr lang="en-US" b="0" i="1" smtClean="0">
+                        <a:latin typeface="Cambria Math" panose="02040503050406030204" pitchFamily="18" charset="0"/>
+                      </a:rPr>
+                      <m:t>]</m:t>
+                    </m:r>
+                  </m:oMath>
+                </a14:m>
+                <a:endParaRPr lang="en-US" dirty="0" smtClean="0"/>
+              </a:p>
+              <a:p>
+                <a:pPr lvl="1"/>
+                <a:r>
+                  <a:rPr lang="en-US" dirty="0" smtClean="0"/>
+                  <a:t>For any two successive periods, </a:t>
+                </a:r>
+                <a14:m>
+                  <m:oMath xmlns:m="http://schemas.openxmlformats.org/officeDocument/2006/math">
+                    <m:r>
+                      <a:rPr lang="en-US" b="0" i="1" smtClean="0">
+                        <a:latin typeface="Cambria Math" panose="02040503050406030204" pitchFamily="18" charset="0"/>
+                      </a:rPr>
+                      <m:t>𝑛</m:t>
+                    </m:r>
+                    <m:r>
+                      <a:rPr lang="en-US" b="0" i="1" smtClean="0">
+                        <a:latin typeface="Cambria Math" panose="02040503050406030204" pitchFamily="18" charset="0"/>
+                      </a:rPr>
+                      <m:t>∗</m:t>
+                    </m:r>
+                    <m:r>
+                      <a:rPr lang="en-US" b="0" i="1" smtClean="0">
+                        <a:latin typeface="Cambria Math" panose="02040503050406030204" pitchFamily="18" charset="0"/>
+                      </a:rPr>
+                      <m:t>𝑇</m:t>
+                    </m:r>
+                  </m:oMath>
+                </a14:m>
+                <a:r>
+                  <a:rPr lang="en-US" dirty="0" smtClean="0"/>
+                  <a:t> and </a:t>
+                </a:r>
+                <a14:m>
+                  <m:oMath xmlns:m="http://schemas.openxmlformats.org/officeDocument/2006/math">
+                    <m:d>
+                      <m:dPr>
+                        <m:ctrlPr>
+                          <a:rPr lang="en-US" b="0" i="1" smtClean="0">
+                            <a:latin typeface="Cambria Math" panose="02040503050406030204" pitchFamily="18" charset="0"/>
+                          </a:rPr>
+                        </m:ctrlPr>
+                      </m:dPr>
+                      <m:e>
+                        <m:r>
+                          <a:rPr lang="en-US" b="0" i="1" smtClean="0">
+                            <a:latin typeface="Cambria Math" panose="02040503050406030204" pitchFamily="18" charset="0"/>
+                          </a:rPr>
+                          <m:t>𝑛</m:t>
+                        </m:r>
+                        <m:r>
+                          <a:rPr lang="en-US" b="0" i="1" smtClean="0">
+                            <a:latin typeface="Cambria Math" panose="02040503050406030204" pitchFamily="18" charset="0"/>
+                          </a:rPr>
+                          <m:t>+1</m:t>
+                        </m:r>
+                      </m:e>
+                    </m:d>
+                    <m:r>
+                      <a:rPr lang="en-US" b="0" i="1" smtClean="0">
+                        <a:latin typeface="Cambria Math" panose="02040503050406030204" pitchFamily="18" charset="0"/>
+                      </a:rPr>
+                      <m:t>∗</m:t>
+                    </m:r>
+                    <m:r>
+                      <a:rPr lang="en-US" b="0" i="1" smtClean="0">
+                        <a:latin typeface="Cambria Math" panose="02040503050406030204" pitchFamily="18" charset="0"/>
+                      </a:rPr>
+                      <m:t>𝑇</m:t>
+                    </m:r>
+                    <m:r>
+                      <a:rPr lang="en-US" b="0" i="1" smtClean="0">
+                        <a:latin typeface="Cambria Math" panose="02040503050406030204" pitchFamily="18" charset="0"/>
+                      </a:rPr>
+                      <m:t>:</m:t>
+                    </m:r>
+                  </m:oMath>
+                </a14:m>
+                <a:r>
+                  <a:rPr lang="en-US" b="0" dirty="0" smtClean="0"/>
+                  <a:t/>
+                </a:r>
+                <a:br>
+                  <a:rPr lang="en-US" b="0" dirty="0" smtClean="0"/>
+                </a:br>
+                <a14:m>
+                  <m:oMath xmlns:m="http://schemas.openxmlformats.org/officeDocument/2006/math">
+                    <m:r>
+                      <a:rPr lang="en-US" b="0" i="1" smtClean="0">
+                        <a:latin typeface="Cambria Math" panose="02040503050406030204" pitchFamily="18" charset="0"/>
+                      </a:rPr>
+                      <m:t>𝐵</m:t>
+                    </m:r>
+                    <m:d>
+                      <m:dPr>
+                        <m:begChr m:val="["/>
+                        <m:endChr m:val="]"/>
+                        <m:ctrlPr>
+                          <a:rPr lang="en-US" b="0" i="1" smtClean="0">
+                            <a:latin typeface="Cambria Math" panose="02040503050406030204" pitchFamily="18" charset="0"/>
+                          </a:rPr>
+                        </m:ctrlPr>
+                      </m:dPr>
+                      <m:e>
+                        <m:r>
+                          <a:rPr lang="en-US" b="0" i="1" smtClean="0">
+                            <a:latin typeface="Cambria Math" panose="02040503050406030204" pitchFamily="18" charset="0"/>
+                          </a:rPr>
+                          <m:t>(</m:t>
+                        </m:r>
+                        <m:r>
+                          <a:rPr lang="en-US" b="0" i="1" smtClean="0">
+                            <a:latin typeface="Cambria Math" panose="02040503050406030204" pitchFamily="18" charset="0"/>
+                          </a:rPr>
+                          <m:t>𝑛</m:t>
+                        </m:r>
+                        <m:r>
+                          <a:rPr lang="en-US" b="0" i="1" smtClean="0">
+                            <a:latin typeface="Cambria Math" panose="02040503050406030204" pitchFamily="18" charset="0"/>
+                          </a:rPr>
+                          <m:t>+1)∗</m:t>
+                        </m:r>
+                        <m:r>
+                          <a:rPr lang="en-US" b="0" i="1" smtClean="0">
+                            <a:latin typeface="Cambria Math" panose="02040503050406030204" pitchFamily="18" charset="0"/>
+                          </a:rPr>
+                          <m:t>𝑇</m:t>
+                        </m:r>
+                      </m:e>
+                    </m:d>
+                    <m:r>
+                      <a:rPr lang="en-US" b="0" i="1" smtClean="0">
+                        <a:latin typeface="Cambria Math" panose="02040503050406030204" pitchFamily="18" charset="0"/>
+                      </a:rPr>
+                      <m:t>&gt;</m:t>
+                    </m:r>
+                    <m:r>
+                      <a:rPr lang="en-US" b="0" i="1" smtClean="0">
+                        <a:latin typeface="Cambria Math" panose="02040503050406030204" pitchFamily="18" charset="0"/>
+                      </a:rPr>
+                      <m:t>𝐵</m:t>
+                    </m:r>
+                    <m:d>
+                      <m:dPr>
+                        <m:begChr m:val="["/>
+                        <m:endChr m:val="]"/>
+                        <m:ctrlPr>
+                          <a:rPr lang="en-US" b="0" i="1" smtClean="0">
+                            <a:latin typeface="Cambria Math" panose="02040503050406030204" pitchFamily="18" charset="0"/>
+                          </a:rPr>
+                        </m:ctrlPr>
+                      </m:dPr>
+                      <m:e>
+                        <m:r>
+                          <a:rPr lang="en-US" b="0" i="1" smtClean="0">
+                            <a:latin typeface="Cambria Math" panose="02040503050406030204" pitchFamily="18" charset="0"/>
+                          </a:rPr>
+                          <m:t>𝑛</m:t>
+                        </m:r>
+                        <m:r>
+                          <a:rPr lang="en-US" b="0" i="1" smtClean="0">
+                            <a:latin typeface="Cambria Math" panose="02040503050406030204" pitchFamily="18" charset="0"/>
+                          </a:rPr>
+                          <m:t>∗</m:t>
+                        </m:r>
+                        <m:r>
+                          <a:rPr lang="en-US" b="0" i="1" smtClean="0">
+                            <a:latin typeface="Cambria Math" panose="02040503050406030204" pitchFamily="18" charset="0"/>
+                          </a:rPr>
+                          <m:t>𝑇</m:t>
+                        </m:r>
+                      </m:e>
+                    </m:d>
+                  </m:oMath>
+                </a14:m>
+                <a:r>
+                  <a:rPr lang="en-US" b="0" dirty="0" smtClean="0"/>
+                  <a:t/>
+                </a:r>
+                <a:br>
+                  <a:rPr lang="en-US" b="0" dirty="0" smtClean="0"/>
+                </a:br>
+                <a14:m>
+                  <m:oMath xmlns:m="http://schemas.openxmlformats.org/officeDocument/2006/math">
+                    <m:r>
+                      <a:rPr lang="en-US" b="0" i="1" smtClean="0">
+                        <a:latin typeface="Cambria Math" panose="02040503050406030204" pitchFamily="18" charset="0"/>
+                      </a:rPr>
+                      <m:t>⇒</m:t>
+                    </m:r>
+                    <m:r>
+                      <a:rPr lang="en-US" b="0" i="1" smtClean="0">
+                        <a:latin typeface="Cambria Math" panose="02040503050406030204" pitchFamily="18" charset="0"/>
+                      </a:rPr>
+                      <m:t>𝐵</m:t>
+                    </m:r>
+                    <m:d>
+                      <m:dPr>
+                        <m:begChr m:val="["/>
+                        <m:endChr m:val="]"/>
+                        <m:ctrlPr>
+                          <a:rPr lang="en-US" b="0" i="1" smtClean="0">
+                            <a:latin typeface="Cambria Math" panose="02040503050406030204" pitchFamily="18" charset="0"/>
+                          </a:rPr>
+                        </m:ctrlPr>
+                      </m:dPr>
+                      <m:e>
+                        <m:r>
+                          <a:rPr lang="en-US" b="0" i="1" smtClean="0">
+                            <a:latin typeface="Cambria Math" panose="02040503050406030204" pitchFamily="18" charset="0"/>
+                          </a:rPr>
+                          <m:t>𝑚</m:t>
+                        </m:r>
+                        <m:r>
+                          <a:rPr lang="en-US" b="0" i="1" smtClean="0">
+                            <a:latin typeface="Cambria Math" panose="02040503050406030204" pitchFamily="18" charset="0"/>
+                          </a:rPr>
+                          <m:t>∗</m:t>
+                        </m:r>
+                        <m:r>
+                          <a:rPr lang="en-US" b="0" i="1" smtClean="0">
+                            <a:latin typeface="Cambria Math" panose="02040503050406030204" pitchFamily="18" charset="0"/>
+                          </a:rPr>
+                          <m:t>𝑇</m:t>
+                        </m:r>
+                      </m:e>
+                    </m:d>
+                    <m:r>
+                      <a:rPr lang="en-US" b="0" i="1" smtClean="0">
+                        <a:latin typeface="Cambria Math" panose="02040503050406030204" pitchFamily="18" charset="0"/>
+                      </a:rPr>
+                      <m:t>&gt;</m:t>
+                    </m:r>
+                    <m:r>
+                      <a:rPr lang="en-US" b="0" i="1" smtClean="0">
+                        <a:latin typeface="Cambria Math" panose="02040503050406030204" pitchFamily="18" charset="0"/>
+                      </a:rPr>
+                      <m:t>𝐵</m:t>
+                    </m:r>
+                    <m:d>
+                      <m:dPr>
+                        <m:begChr m:val="["/>
+                        <m:endChr m:val="]"/>
+                        <m:ctrlPr>
+                          <a:rPr lang="en-US" b="0" i="1" smtClean="0">
+                            <a:latin typeface="Cambria Math" panose="02040503050406030204" pitchFamily="18" charset="0"/>
+                          </a:rPr>
+                        </m:ctrlPr>
+                      </m:dPr>
+                      <m:e>
+                        <m:r>
+                          <a:rPr lang="en-US" b="0" i="1" smtClean="0">
+                            <a:latin typeface="Cambria Math" panose="02040503050406030204" pitchFamily="18" charset="0"/>
+                          </a:rPr>
+                          <m:t>𝑛</m:t>
+                        </m:r>
+                        <m:r>
+                          <a:rPr lang="en-US" b="0" i="1" smtClean="0">
+                            <a:latin typeface="Cambria Math" panose="02040503050406030204" pitchFamily="18" charset="0"/>
+                          </a:rPr>
+                          <m:t>∗</m:t>
+                        </m:r>
+                        <m:r>
+                          <a:rPr lang="en-US" b="0" i="1" smtClean="0">
+                            <a:latin typeface="Cambria Math" panose="02040503050406030204" pitchFamily="18" charset="0"/>
+                          </a:rPr>
+                          <m:t>𝑇</m:t>
+                        </m:r>
+                      </m:e>
+                    </m:d>
+                    <m:r>
+                      <a:rPr lang="en-US" i="1">
+                        <a:latin typeface="Cambria Math" panose="02040503050406030204" pitchFamily="18" charset="0"/>
+                      </a:rPr>
+                      <m:t>, ∀</m:t>
+                    </m:r>
+                    <m:r>
+                      <a:rPr lang="en-US" i="1">
+                        <a:latin typeface="Cambria Math" panose="02040503050406030204" pitchFamily="18" charset="0"/>
+                      </a:rPr>
+                      <m:t>𝑚</m:t>
+                    </m:r>
+                    <m:r>
+                      <a:rPr lang="en-US" i="1">
+                        <a:latin typeface="Cambria Math" panose="02040503050406030204" pitchFamily="18" charset="0"/>
+                      </a:rPr>
+                      <m:t>,</m:t>
+                    </m:r>
+                    <m:r>
+                      <a:rPr lang="en-US" i="1">
+                        <a:latin typeface="Cambria Math" panose="02040503050406030204" pitchFamily="18" charset="0"/>
+                      </a:rPr>
+                      <m:t>𝑛</m:t>
+                    </m:r>
+                    <m:r>
+                      <a:rPr lang="en-US" i="1">
+                        <a:latin typeface="Cambria Math" panose="02040503050406030204" pitchFamily="18" charset="0"/>
+                      </a:rPr>
+                      <m:t>∈</m:t>
+                    </m:r>
+                    <m:r>
+                      <a:rPr lang="en-US" i="1">
+                        <a:latin typeface="Cambria Math" panose="02040503050406030204" pitchFamily="18" charset="0"/>
+                      </a:rPr>
+                      <m:t>ℕ</m:t>
+                    </m:r>
+                    <m:r>
+                      <a:rPr lang="en-US" b="0" i="1" smtClean="0">
+                        <a:latin typeface="Cambria Math" panose="02040503050406030204" pitchFamily="18" charset="0"/>
+                      </a:rPr>
+                      <m:t>:</m:t>
+                    </m:r>
+                    <m:r>
+                      <a:rPr lang="en-US" b="0" i="1" smtClean="0">
+                        <a:latin typeface="Cambria Math" panose="02040503050406030204" pitchFamily="18" charset="0"/>
+                      </a:rPr>
+                      <m:t>𝑚</m:t>
+                    </m:r>
+                    <m:r>
+                      <a:rPr lang="en-US" i="1">
+                        <a:latin typeface="Cambria Math" panose="02040503050406030204" pitchFamily="18" charset="0"/>
+                      </a:rPr>
+                      <m:t>&gt;</m:t>
+                    </m:r>
+                    <m:r>
+                      <a:rPr lang="en-US" i="1">
+                        <a:latin typeface="Cambria Math" panose="02040503050406030204" pitchFamily="18" charset="0"/>
+                      </a:rPr>
+                      <m:t>𝑛</m:t>
+                    </m:r>
+                    <m:r>
+                      <a:rPr lang="en-US" i="1">
+                        <a:latin typeface="Cambria Math" panose="02040503050406030204" pitchFamily="18" charset="0"/>
+                      </a:rPr>
+                      <m:t>&gt;0</m:t>
+                    </m:r>
+                  </m:oMath>
+                </a14:m>
+                <a:r>
+                  <a:rPr lang="en-US" dirty="0" smtClean="0"/>
+                  <a:t/>
+                </a:r>
+                <a:br>
+                  <a:rPr lang="en-US" dirty="0" smtClean="0"/>
+                </a:br>
+                <a14:m>
+                  <m:oMath xmlns:m="http://schemas.openxmlformats.org/officeDocument/2006/math">
+                    <m:r>
+                      <a:rPr lang="en-US" b="0" i="1" smtClean="0">
+                        <a:latin typeface="Cambria Math" panose="02040503050406030204" pitchFamily="18" charset="0"/>
+                      </a:rPr>
+                      <m:t>⇒</m:t>
+                    </m:r>
+                    <m:r>
+                      <a:rPr lang="en-US" b="0" i="1" smtClean="0">
+                        <a:latin typeface="Cambria Math" panose="02040503050406030204" pitchFamily="18" charset="0"/>
+                      </a:rPr>
+                      <m:t>𝐵</m:t>
+                    </m:r>
+                    <m:d>
+                      <m:dPr>
+                        <m:begChr m:val="["/>
+                        <m:endChr m:val="]"/>
+                        <m:ctrlPr>
+                          <a:rPr lang="en-US" b="0" i="1" smtClean="0">
+                            <a:latin typeface="Cambria Math" panose="02040503050406030204" pitchFamily="18" charset="0"/>
+                          </a:rPr>
+                        </m:ctrlPr>
+                      </m:dPr>
+                      <m:e>
+                        <m:r>
+                          <a:rPr lang="en-US" b="0" i="1" smtClean="0">
+                            <a:latin typeface="Cambria Math" panose="02040503050406030204" pitchFamily="18" charset="0"/>
+                          </a:rPr>
+                          <m:t>𝑡</m:t>
+                        </m:r>
+                      </m:e>
+                    </m:d>
+                    <m:r>
+                      <a:rPr lang="en-US" b="0" i="1" smtClean="0">
+                        <a:latin typeface="Cambria Math" panose="02040503050406030204" pitchFamily="18" charset="0"/>
+                      </a:rPr>
+                      <m:t>&lt;</m:t>
+                    </m:r>
+                    <m:r>
+                      <a:rPr lang="en-US" b="0" i="1" smtClean="0">
+                        <a:latin typeface="Cambria Math" panose="02040503050406030204" pitchFamily="18" charset="0"/>
+                      </a:rPr>
+                      <m:t>𝐵</m:t>
+                    </m:r>
+                    <m:d>
+                      <m:dPr>
+                        <m:begChr m:val="["/>
+                        <m:endChr m:val="]"/>
+                        <m:ctrlPr>
+                          <a:rPr lang="en-US" b="0" i="1" smtClean="0">
+                            <a:latin typeface="Cambria Math" panose="02040503050406030204" pitchFamily="18" charset="0"/>
+                          </a:rPr>
+                        </m:ctrlPr>
+                      </m:dPr>
+                      <m:e>
+                        <m:r>
+                          <a:rPr lang="en-US" b="0" i="1" smtClean="0">
+                            <a:latin typeface="Cambria Math" panose="02040503050406030204" pitchFamily="18" charset="0"/>
+                          </a:rPr>
+                          <m:t>𝑡</m:t>
+                        </m:r>
+                        <m:r>
+                          <a:rPr lang="en-US" b="0" i="1" smtClean="0">
+                            <a:latin typeface="Cambria Math" panose="02040503050406030204" pitchFamily="18" charset="0"/>
+                          </a:rPr>
+                          <m:t>+</m:t>
+                        </m:r>
+                        <m:r>
+                          <a:rPr lang="en-US" b="0" i="1" smtClean="0">
+                            <a:latin typeface="Cambria Math" panose="02040503050406030204" pitchFamily="18" charset="0"/>
+                          </a:rPr>
+                          <m:t>𝑘</m:t>
+                        </m:r>
+                        <m:r>
+                          <a:rPr lang="en-US" b="0" i="1" smtClean="0">
+                            <a:latin typeface="Cambria Math" panose="02040503050406030204" pitchFamily="18" charset="0"/>
+                          </a:rPr>
+                          <m:t>∗</m:t>
+                        </m:r>
+                        <m:r>
+                          <a:rPr lang="en-US" b="0" i="1" smtClean="0">
+                            <a:latin typeface="Cambria Math" panose="02040503050406030204" pitchFamily="18" charset="0"/>
+                          </a:rPr>
+                          <m:t>𝑇</m:t>
+                        </m:r>
+                      </m:e>
+                    </m:d>
+                    <m:r>
+                      <a:rPr lang="en-US" b="0" i="1" smtClean="0">
+                        <a:latin typeface="Cambria Math" panose="02040503050406030204" pitchFamily="18" charset="0"/>
+                      </a:rPr>
+                      <m:t>,∀</m:t>
+                    </m:r>
+                    <m:r>
+                      <a:rPr lang="en-US" b="0" i="1" smtClean="0">
+                        <a:latin typeface="Cambria Math" panose="02040503050406030204" pitchFamily="18" charset="0"/>
+                      </a:rPr>
+                      <m:t>𝑘</m:t>
+                    </m:r>
+                    <m:r>
+                      <a:rPr lang="en-US" b="0" i="1" smtClean="0">
+                        <a:latin typeface="Cambria Math" panose="02040503050406030204" pitchFamily="18" charset="0"/>
+                      </a:rPr>
+                      <m:t>∈</m:t>
+                    </m:r>
+                    <m:r>
+                      <a:rPr lang="en-US" i="1">
+                        <a:latin typeface="Cambria Math" panose="02040503050406030204" pitchFamily="18" charset="0"/>
+                      </a:rPr>
+                      <m:t>ℕ</m:t>
+                    </m:r>
+                    <m:r>
+                      <a:rPr lang="en-US" b="0" i="1" smtClean="0">
+                        <a:latin typeface="Cambria Math" panose="02040503050406030204" pitchFamily="18" charset="0"/>
+                      </a:rPr>
+                      <m:t>:</m:t>
+                    </m:r>
+                    <m:r>
+                      <a:rPr lang="en-US" b="0" i="1" smtClean="0">
+                        <a:latin typeface="Cambria Math" panose="02040503050406030204" pitchFamily="18" charset="0"/>
+                      </a:rPr>
+                      <m:t>𝑘</m:t>
+                    </m:r>
+                    <m:r>
+                      <a:rPr lang="en-US" b="0" i="1" smtClean="0">
+                        <a:latin typeface="Cambria Math" panose="02040503050406030204" pitchFamily="18" charset="0"/>
+                      </a:rPr>
+                      <m:t>&gt;0</m:t>
+                    </m:r>
+                  </m:oMath>
+                </a14:m>
+                <a:endParaRPr lang="en-US" dirty="0" smtClean="0"/>
+              </a:p>
+              <a:p>
+                <a:pPr lvl="2"/>
+                <a:r>
+                  <a:rPr lang="en-US" dirty="0" smtClean="0"/>
+                  <a:t>Implies that the system has </a:t>
+                </a:r>
+                <a:r>
+                  <a:rPr lang="en-US" b="1" dirty="0" smtClean="0"/>
+                  <a:t>unbounded buffer growth</a:t>
+                </a:r>
+                <a:endParaRPr lang="en-US" dirty="0" smtClean="0"/>
+              </a:p>
+              <a:p>
+                <a:r>
+                  <a:rPr lang="en-US" dirty="0" smtClean="0"/>
+                  <a:t>Consider the scenario when </a:t>
+                </a:r>
+                <a14:m>
+                  <m:oMath xmlns:m="http://schemas.openxmlformats.org/officeDocument/2006/math">
+                    <m:r>
+                      <a:rPr lang="en-US" b="0" i="1" smtClean="0">
+                        <a:latin typeface="Cambria Math" panose="02040503050406030204" pitchFamily="18" charset="0"/>
+                      </a:rPr>
+                      <m:t>𝑅</m:t>
+                    </m:r>
+                    <m:d>
+                      <m:dPr>
+                        <m:begChr m:val="["/>
+                        <m:endChr m:val="]"/>
+                        <m:ctrlPr>
+                          <a:rPr lang="en-US" b="0" i="1" smtClean="0">
+                            <a:latin typeface="Cambria Math" panose="02040503050406030204" pitchFamily="18" charset="0"/>
+                          </a:rPr>
+                        </m:ctrlPr>
+                      </m:dPr>
+                      <m:e>
+                        <m:r>
+                          <a:rPr lang="en-US" b="0" i="1" smtClean="0">
+                            <a:latin typeface="Cambria Math" panose="02040503050406030204" pitchFamily="18" charset="0"/>
+                          </a:rPr>
+                          <m:t>𝑇</m:t>
+                        </m:r>
+                      </m:e>
+                    </m:d>
+                    <m:r>
+                      <a:rPr lang="en-US" b="0" i="1" smtClean="0">
+                        <a:latin typeface="Cambria Math" panose="02040503050406030204" pitchFamily="18" charset="0"/>
+                      </a:rPr>
+                      <m:t>≥</m:t>
+                    </m:r>
+                    <m:r>
+                      <a:rPr lang="en-US" b="0" i="1" smtClean="0">
+                        <a:latin typeface="Cambria Math" panose="02040503050406030204" pitchFamily="18" charset="0"/>
+                      </a:rPr>
+                      <m:t>𝐵</m:t>
+                    </m:r>
+                    <m:r>
+                      <a:rPr lang="en-US" b="0" i="1" smtClean="0">
+                        <a:latin typeface="Cambria Math" panose="02040503050406030204" pitchFamily="18" charset="0"/>
+                      </a:rPr>
+                      <m:t>[</m:t>
+                    </m:r>
+                    <m:r>
+                      <a:rPr lang="en-US" b="0" i="1" smtClean="0">
+                        <a:latin typeface="Cambria Math" panose="02040503050406030204" pitchFamily="18" charset="0"/>
+                      </a:rPr>
+                      <m:t>𝑇</m:t>
+                    </m:r>
+                    <m:r>
+                      <a:rPr lang="en-US" b="0" i="1" smtClean="0">
+                        <a:latin typeface="Cambria Math" panose="02040503050406030204" pitchFamily="18" charset="0"/>
+                      </a:rPr>
+                      <m:t>]</m:t>
+                    </m:r>
+                  </m:oMath>
+                </a14:m>
+                <a:r>
+                  <a:rPr lang="en-US" dirty="0" smtClean="0"/>
+                  <a:t>,</a:t>
+                </a:r>
+              </a:p>
+              <a:p>
+                <a:pPr lvl="1"/>
+                <a:r>
+                  <a:rPr lang="en-US" dirty="0" smtClean="0"/>
+                  <a:t>The system can service in a period the amount of data remaining in the buffer from the preceding period, therefore </a:t>
+                </a:r>
+                <a14:m>
+                  <m:oMath xmlns:m="http://schemas.openxmlformats.org/officeDocument/2006/math">
+                    <m:r>
+                      <a:rPr lang="en-US" b="0" i="1" smtClean="0">
+                        <a:latin typeface="Cambria Math" panose="02040503050406030204" pitchFamily="18" charset="0"/>
+                      </a:rPr>
+                      <m:t>𝐵</m:t>
+                    </m:r>
+                    <m:d>
+                      <m:dPr>
+                        <m:begChr m:val="["/>
+                        <m:endChr m:val="]"/>
+                        <m:ctrlPr>
+                          <a:rPr lang="en-US" b="0" i="1" smtClean="0">
+                            <a:latin typeface="Cambria Math" panose="02040503050406030204" pitchFamily="18" charset="0"/>
+                          </a:rPr>
+                        </m:ctrlPr>
+                      </m:dPr>
+                      <m:e>
+                        <m:r>
+                          <a:rPr lang="en-US" b="0" i="1" smtClean="0">
+                            <a:latin typeface="Cambria Math" panose="02040503050406030204" pitchFamily="18" charset="0"/>
+                          </a:rPr>
+                          <m:t>2∗</m:t>
+                        </m:r>
+                        <m:r>
+                          <a:rPr lang="en-US" b="0" i="1" smtClean="0">
+                            <a:latin typeface="Cambria Math" panose="02040503050406030204" pitchFamily="18" charset="0"/>
+                          </a:rPr>
+                          <m:t>𝑇</m:t>
+                        </m:r>
+                      </m:e>
+                    </m:d>
+                    <m:r>
+                      <a:rPr lang="en-US" b="0" i="1" smtClean="0">
+                        <a:latin typeface="Cambria Math" panose="02040503050406030204" pitchFamily="18" charset="0"/>
+                      </a:rPr>
+                      <m:t>=</m:t>
+                    </m:r>
+                    <m:r>
+                      <a:rPr lang="en-US" b="0" i="1" smtClean="0">
+                        <a:latin typeface="Cambria Math" panose="02040503050406030204" pitchFamily="18" charset="0"/>
+                      </a:rPr>
+                      <m:t>𝐵</m:t>
+                    </m:r>
+                    <m:r>
+                      <a:rPr lang="en-US" b="0" i="1" smtClean="0">
+                        <a:latin typeface="Cambria Math" panose="02040503050406030204" pitchFamily="18" charset="0"/>
+                      </a:rPr>
+                      <m:t>[</m:t>
+                    </m:r>
+                    <m:r>
+                      <a:rPr lang="en-US" b="0" i="1" smtClean="0">
+                        <a:latin typeface="Cambria Math" panose="02040503050406030204" pitchFamily="18" charset="0"/>
+                      </a:rPr>
+                      <m:t>𝑇</m:t>
+                    </m:r>
+                    <m:r>
+                      <a:rPr lang="en-US" b="0" i="1" smtClean="0">
+                        <a:latin typeface="Cambria Math" panose="02040503050406030204" pitchFamily="18" charset="0"/>
+                      </a:rPr>
+                      <m:t>]</m:t>
+                    </m:r>
+                  </m:oMath>
+                </a14:m>
+                <a:endParaRPr lang="en-US" dirty="0"/>
+              </a:p>
+              <a:p>
+                <a:pPr lvl="1"/>
+                <a:r>
+                  <a:rPr lang="en-US" dirty="0"/>
+                  <a:t>For any two successive periods, </a:t>
+                </a:r>
+                <a14:m>
+                  <m:oMath xmlns:m="http://schemas.openxmlformats.org/officeDocument/2006/math">
+                    <m:r>
+                      <a:rPr lang="en-US" i="1">
+                        <a:latin typeface="Cambria Math" panose="02040503050406030204" pitchFamily="18" charset="0"/>
+                      </a:rPr>
+                      <m:t>𝑛</m:t>
+                    </m:r>
+                    <m:r>
+                      <a:rPr lang="en-US" i="1">
+                        <a:latin typeface="Cambria Math" panose="02040503050406030204" pitchFamily="18" charset="0"/>
+                      </a:rPr>
+                      <m:t>∗</m:t>
+                    </m:r>
+                    <m:r>
+                      <a:rPr lang="en-US" i="1">
+                        <a:latin typeface="Cambria Math" panose="02040503050406030204" pitchFamily="18" charset="0"/>
+                      </a:rPr>
+                      <m:t>𝑇</m:t>
+                    </m:r>
+                  </m:oMath>
+                </a14:m>
+                <a:r>
+                  <a:rPr lang="en-US" dirty="0"/>
+                  <a:t> and </a:t>
+                </a:r>
+                <a14:m>
+                  <m:oMath xmlns:m="http://schemas.openxmlformats.org/officeDocument/2006/math">
+                    <m:d>
+                      <m:dPr>
+                        <m:ctrlPr>
+                          <a:rPr lang="en-US" i="1">
+                            <a:latin typeface="Cambria Math" panose="02040503050406030204" pitchFamily="18" charset="0"/>
+                          </a:rPr>
+                        </m:ctrlPr>
+                      </m:dPr>
+                      <m:e>
+                        <m:r>
+                          <a:rPr lang="en-US" i="1">
+                            <a:latin typeface="Cambria Math" panose="02040503050406030204" pitchFamily="18" charset="0"/>
+                          </a:rPr>
+                          <m:t>𝑛</m:t>
+                        </m:r>
+                        <m:r>
+                          <a:rPr lang="en-US" i="1">
+                            <a:latin typeface="Cambria Math" panose="02040503050406030204" pitchFamily="18" charset="0"/>
+                          </a:rPr>
+                          <m:t>+1</m:t>
+                        </m:r>
+                      </m:e>
+                    </m:d>
+                    <m:r>
+                      <a:rPr lang="en-US" i="1">
+                        <a:latin typeface="Cambria Math" panose="02040503050406030204" pitchFamily="18" charset="0"/>
+                      </a:rPr>
+                      <m:t>∗</m:t>
+                    </m:r>
+                    <m:r>
+                      <a:rPr lang="en-US" i="1">
+                        <a:latin typeface="Cambria Math" panose="02040503050406030204" pitchFamily="18" charset="0"/>
+                      </a:rPr>
+                      <m:t>𝑇</m:t>
+                    </m:r>
+                    <m:r>
+                      <a:rPr lang="en-US" b="0" i="1" smtClean="0">
+                        <a:latin typeface="Cambria Math" panose="02040503050406030204" pitchFamily="18" charset="0"/>
+                      </a:rPr>
+                      <m:t>:</m:t>
+                    </m:r>
+                  </m:oMath>
+                </a14:m>
+                <a:r>
+                  <a:rPr lang="en-US" dirty="0"/>
+                  <a:t/>
+                </a:r>
+                <a:br>
+                  <a:rPr lang="en-US" dirty="0"/>
+                </a:br>
+                <a14:m>
+                  <m:oMath xmlns:m="http://schemas.openxmlformats.org/officeDocument/2006/math">
+                    <m:r>
+                      <a:rPr lang="en-US" i="1">
+                        <a:latin typeface="Cambria Math" panose="02040503050406030204" pitchFamily="18" charset="0"/>
+                      </a:rPr>
+                      <m:t>𝐵</m:t>
+                    </m:r>
+                    <m:d>
+                      <m:dPr>
+                        <m:begChr m:val="["/>
+                        <m:endChr m:val="]"/>
+                        <m:ctrlPr>
+                          <a:rPr lang="en-US" i="1">
+                            <a:latin typeface="Cambria Math" panose="02040503050406030204" pitchFamily="18" charset="0"/>
+                          </a:rPr>
+                        </m:ctrlPr>
+                      </m:dPr>
+                      <m:e>
+                        <m:r>
+                          <a:rPr lang="en-US" i="1">
+                            <a:latin typeface="Cambria Math" panose="02040503050406030204" pitchFamily="18" charset="0"/>
+                          </a:rPr>
+                          <m:t>(</m:t>
+                        </m:r>
+                        <m:r>
+                          <a:rPr lang="en-US" i="1">
+                            <a:latin typeface="Cambria Math" panose="02040503050406030204" pitchFamily="18" charset="0"/>
+                          </a:rPr>
+                          <m:t>𝑛</m:t>
+                        </m:r>
+                        <m:r>
+                          <a:rPr lang="en-US" i="1">
+                            <a:latin typeface="Cambria Math" panose="02040503050406030204" pitchFamily="18" charset="0"/>
+                          </a:rPr>
+                          <m:t>+1)∗</m:t>
+                        </m:r>
+                        <m:r>
+                          <a:rPr lang="en-US" i="1">
+                            <a:latin typeface="Cambria Math" panose="02040503050406030204" pitchFamily="18" charset="0"/>
+                          </a:rPr>
+                          <m:t>𝑇</m:t>
+                        </m:r>
+                      </m:e>
+                    </m:d>
+                    <m:r>
+                      <a:rPr lang="en-US" b="0" i="1" smtClean="0">
+                        <a:latin typeface="Cambria Math" panose="02040503050406030204" pitchFamily="18" charset="0"/>
+                      </a:rPr>
+                      <m:t>=</m:t>
+                    </m:r>
+                    <m:r>
+                      <a:rPr lang="en-US" i="1">
+                        <a:latin typeface="Cambria Math" panose="02040503050406030204" pitchFamily="18" charset="0"/>
+                      </a:rPr>
+                      <m:t>𝐵</m:t>
+                    </m:r>
+                    <m:d>
+                      <m:dPr>
+                        <m:begChr m:val="["/>
+                        <m:endChr m:val="]"/>
+                        <m:ctrlPr>
+                          <a:rPr lang="en-US" i="1">
+                            <a:latin typeface="Cambria Math" panose="02040503050406030204" pitchFamily="18" charset="0"/>
+                          </a:rPr>
+                        </m:ctrlPr>
+                      </m:dPr>
+                      <m:e>
+                        <m:r>
+                          <a:rPr lang="en-US" i="1">
+                            <a:latin typeface="Cambria Math" panose="02040503050406030204" pitchFamily="18" charset="0"/>
+                          </a:rPr>
+                          <m:t>𝑛</m:t>
+                        </m:r>
+                        <m:r>
+                          <a:rPr lang="en-US" i="1">
+                            <a:latin typeface="Cambria Math" panose="02040503050406030204" pitchFamily="18" charset="0"/>
+                          </a:rPr>
+                          <m:t>∗</m:t>
+                        </m:r>
+                        <m:r>
+                          <a:rPr lang="en-US" i="1">
+                            <a:latin typeface="Cambria Math" panose="02040503050406030204" pitchFamily="18" charset="0"/>
+                          </a:rPr>
+                          <m:t>𝑇</m:t>
+                        </m:r>
+                      </m:e>
+                    </m:d>
+                  </m:oMath>
+                </a14:m>
+                <a:r>
+                  <a:rPr lang="en-US" dirty="0"/>
+                  <a:t/>
+                </a:r>
+                <a:br>
+                  <a:rPr lang="en-US" dirty="0"/>
+                </a:br>
+                <a14:m>
+                  <m:oMath xmlns:m="http://schemas.openxmlformats.org/officeDocument/2006/math">
+                    <m:r>
+                      <a:rPr lang="en-US" i="1">
+                        <a:latin typeface="Cambria Math" panose="02040503050406030204" pitchFamily="18" charset="0"/>
+                      </a:rPr>
+                      <m:t>⇒</m:t>
+                    </m:r>
+                    <m:r>
+                      <a:rPr lang="en-US" i="1">
+                        <a:latin typeface="Cambria Math" panose="02040503050406030204" pitchFamily="18" charset="0"/>
+                      </a:rPr>
+                      <m:t>𝐵</m:t>
+                    </m:r>
+                    <m:d>
+                      <m:dPr>
+                        <m:begChr m:val="["/>
+                        <m:endChr m:val="]"/>
+                        <m:ctrlPr>
+                          <a:rPr lang="en-US" i="1">
+                            <a:latin typeface="Cambria Math" panose="02040503050406030204" pitchFamily="18" charset="0"/>
+                          </a:rPr>
+                        </m:ctrlPr>
+                      </m:dPr>
+                      <m:e>
+                        <m:r>
+                          <a:rPr lang="en-US" i="1">
+                            <a:latin typeface="Cambria Math" panose="02040503050406030204" pitchFamily="18" charset="0"/>
+                          </a:rPr>
+                          <m:t>𝑚</m:t>
+                        </m:r>
+                        <m:r>
+                          <a:rPr lang="en-US" i="1">
+                            <a:latin typeface="Cambria Math" panose="02040503050406030204" pitchFamily="18" charset="0"/>
+                          </a:rPr>
+                          <m:t>∗</m:t>
+                        </m:r>
+                        <m:r>
+                          <a:rPr lang="en-US" i="1">
+                            <a:latin typeface="Cambria Math" panose="02040503050406030204" pitchFamily="18" charset="0"/>
+                          </a:rPr>
+                          <m:t>𝑇</m:t>
+                        </m:r>
+                      </m:e>
+                    </m:d>
+                    <m:r>
+                      <a:rPr lang="en-US" b="0" i="1" smtClean="0">
+                        <a:latin typeface="Cambria Math" panose="02040503050406030204" pitchFamily="18" charset="0"/>
+                      </a:rPr>
+                      <m:t>=</m:t>
+                    </m:r>
+                    <m:r>
+                      <a:rPr lang="en-US" i="1">
+                        <a:latin typeface="Cambria Math" panose="02040503050406030204" pitchFamily="18" charset="0"/>
+                      </a:rPr>
+                      <m:t>𝐵</m:t>
+                    </m:r>
+                    <m:d>
+                      <m:dPr>
+                        <m:begChr m:val="["/>
+                        <m:endChr m:val="]"/>
+                        <m:ctrlPr>
+                          <a:rPr lang="en-US" i="1">
+                            <a:latin typeface="Cambria Math" panose="02040503050406030204" pitchFamily="18" charset="0"/>
+                          </a:rPr>
+                        </m:ctrlPr>
+                      </m:dPr>
+                      <m:e>
+                        <m:r>
+                          <a:rPr lang="en-US" i="1">
+                            <a:latin typeface="Cambria Math" panose="02040503050406030204" pitchFamily="18" charset="0"/>
+                          </a:rPr>
+                          <m:t>𝑛</m:t>
+                        </m:r>
+                        <m:r>
+                          <a:rPr lang="en-US" i="1">
+                            <a:latin typeface="Cambria Math" panose="02040503050406030204" pitchFamily="18" charset="0"/>
+                          </a:rPr>
+                          <m:t>∗</m:t>
+                        </m:r>
+                        <m:r>
+                          <a:rPr lang="en-US" i="1">
+                            <a:latin typeface="Cambria Math" panose="02040503050406030204" pitchFamily="18" charset="0"/>
+                          </a:rPr>
+                          <m:t>𝑇</m:t>
+                        </m:r>
+                      </m:e>
+                    </m:d>
+                    <m:r>
+                      <a:rPr lang="en-US" i="1">
+                        <a:latin typeface="Cambria Math" panose="02040503050406030204" pitchFamily="18" charset="0"/>
+                      </a:rPr>
+                      <m:t>, ∀</m:t>
+                    </m:r>
+                    <m:r>
+                      <a:rPr lang="en-US" i="1">
+                        <a:latin typeface="Cambria Math" panose="02040503050406030204" pitchFamily="18" charset="0"/>
+                      </a:rPr>
+                      <m:t>𝑚</m:t>
+                    </m:r>
+                    <m:r>
+                      <a:rPr lang="en-US" i="1">
+                        <a:latin typeface="Cambria Math" panose="02040503050406030204" pitchFamily="18" charset="0"/>
+                      </a:rPr>
+                      <m:t>,</m:t>
+                    </m:r>
+                    <m:r>
+                      <a:rPr lang="en-US" i="1">
+                        <a:latin typeface="Cambria Math" panose="02040503050406030204" pitchFamily="18" charset="0"/>
+                      </a:rPr>
+                      <m:t>𝑛</m:t>
+                    </m:r>
+                    <m:r>
+                      <a:rPr lang="en-US" i="1">
+                        <a:latin typeface="Cambria Math" panose="02040503050406030204" pitchFamily="18" charset="0"/>
+                      </a:rPr>
+                      <m:t>∈</m:t>
+                    </m:r>
+                    <m:r>
+                      <a:rPr lang="en-US" i="1">
+                        <a:latin typeface="Cambria Math" panose="02040503050406030204" pitchFamily="18" charset="0"/>
+                      </a:rPr>
+                      <m:t>ℕ</m:t>
+                    </m:r>
+                    <m:r>
+                      <a:rPr lang="en-US" i="1">
+                        <a:latin typeface="Cambria Math" panose="02040503050406030204" pitchFamily="18" charset="0"/>
+                      </a:rPr>
+                      <m:t>:</m:t>
+                    </m:r>
+                    <m:r>
+                      <a:rPr lang="en-US" i="1">
+                        <a:latin typeface="Cambria Math" panose="02040503050406030204" pitchFamily="18" charset="0"/>
+                      </a:rPr>
+                      <m:t>𝑚</m:t>
+                    </m:r>
+                    <m:r>
+                      <a:rPr lang="en-US" i="1">
+                        <a:latin typeface="Cambria Math" panose="02040503050406030204" pitchFamily="18" charset="0"/>
+                      </a:rPr>
+                      <m:t>&gt;</m:t>
+                    </m:r>
+                    <m:r>
+                      <a:rPr lang="en-US" i="1">
+                        <a:latin typeface="Cambria Math" panose="02040503050406030204" pitchFamily="18" charset="0"/>
+                      </a:rPr>
+                      <m:t>𝑛</m:t>
+                    </m:r>
+                    <m:r>
+                      <a:rPr lang="en-US" i="1">
+                        <a:latin typeface="Cambria Math" panose="02040503050406030204" pitchFamily="18" charset="0"/>
+                      </a:rPr>
+                      <m:t>&gt;0</m:t>
+                    </m:r>
+                  </m:oMath>
+                </a14:m>
+                <a:r>
+                  <a:rPr lang="en-US" dirty="0"/>
+                  <a:t/>
+                </a:r>
+                <a:br>
+                  <a:rPr lang="en-US" dirty="0"/>
+                </a:br>
+                <a14:m>
+                  <m:oMath xmlns:m="http://schemas.openxmlformats.org/officeDocument/2006/math">
+                    <m:r>
+                      <a:rPr lang="en-US" i="1">
+                        <a:latin typeface="Cambria Math" panose="02040503050406030204" pitchFamily="18" charset="0"/>
+                      </a:rPr>
+                      <m:t>⇒</m:t>
+                    </m:r>
+                    <m:r>
+                      <a:rPr lang="en-US" i="1">
+                        <a:latin typeface="Cambria Math" panose="02040503050406030204" pitchFamily="18" charset="0"/>
+                      </a:rPr>
+                      <m:t>𝐵</m:t>
+                    </m:r>
+                    <m:d>
+                      <m:dPr>
+                        <m:begChr m:val="["/>
+                        <m:endChr m:val="]"/>
+                        <m:ctrlPr>
+                          <a:rPr lang="en-US" i="1">
+                            <a:latin typeface="Cambria Math" panose="02040503050406030204" pitchFamily="18" charset="0"/>
+                          </a:rPr>
+                        </m:ctrlPr>
+                      </m:dPr>
+                      <m:e>
+                        <m:r>
+                          <a:rPr lang="en-US" i="1">
+                            <a:latin typeface="Cambria Math" panose="02040503050406030204" pitchFamily="18" charset="0"/>
+                          </a:rPr>
+                          <m:t>𝑡</m:t>
+                        </m:r>
+                      </m:e>
+                    </m:d>
+                    <m:r>
+                      <a:rPr lang="en-US" b="0" i="1" smtClean="0">
+                        <a:latin typeface="Cambria Math" panose="02040503050406030204" pitchFamily="18" charset="0"/>
+                      </a:rPr>
+                      <m:t>=</m:t>
+                    </m:r>
+                    <m:r>
+                      <a:rPr lang="en-US" i="1">
+                        <a:latin typeface="Cambria Math" panose="02040503050406030204" pitchFamily="18" charset="0"/>
+                      </a:rPr>
+                      <m:t>𝐵</m:t>
+                    </m:r>
+                    <m:d>
+                      <m:dPr>
+                        <m:begChr m:val="["/>
+                        <m:endChr m:val="]"/>
+                        <m:ctrlPr>
+                          <a:rPr lang="en-US" i="1">
+                            <a:latin typeface="Cambria Math" panose="02040503050406030204" pitchFamily="18" charset="0"/>
+                          </a:rPr>
+                        </m:ctrlPr>
+                      </m:dPr>
+                      <m:e>
+                        <m:r>
+                          <a:rPr lang="en-US" i="1">
+                            <a:latin typeface="Cambria Math" panose="02040503050406030204" pitchFamily="18" charset="0"/>
+                          </a:rPr>
+                          <m:t>𝑡</m:t>
+                        </m:r>
+                        <m:r>
+                          <a:rPr lang="en-US" i="1">
+                            <a:latin typeface="Cambria Math" panose="02040503050406030204" pitchFamily="18" charset="0"/>
+                          </a:rPr>
+                          <m:t>+</m:t>
+                        </m:r>
+                        <m:r>
+                          <a:rPr lang="en-US" i="1">
+                            <a:latin typeface="Cambria Math" panose="02040503050406030204" pitchFamily="18" charset="0"/>
+                          </a:rPr>
+                          <m:t>𝑘</m:t>
+                        </m:r>
+                        <m:r>
+                          <a:rPr lang="en-US" i="1">
+                            <a:latin typeface="Cambria Math" panose="02040503050406030204" pitchFamily="18" charset="0"/>
+                          </a:rPr>
+                          <m:t>∗</m:t>
+                        </m:r>
+                        <m:r>
+                          <a:rPr lang="en-US" i="1">
+                            <a:latin typeface="Cambria Math" panose="02040503050406030204" pitchFamily="18" charset="0"/>
+                          </a:rPr>
+                          <m:t>𝑇</m:t>
+                        </m:r>
+                      </m:e>
+                    </m:d>
+                    <m:r>
+                      <a:rPr lang="en-US" i="1">
+                        <a:latin typeface="Cambria Math" panose="02040503050406030204" pitchFamily="18" charset="0"/>
+                      </a:rPr>
+                      <m:t>,∀</m:t>
+                    </m:r>
+                    <m:r>
+                      <a:rPr lang="en-US" i="1">
+                        <a:latin typeface="Cambria Math" panose="02040503050406030204" pitchFamily="18" charset="0"/>
+                      </a:rPr>
+                      <m:t>𝑘</m:t>
+                    </m:r>
+                    <m:r>
+                      <a:rPr lang="en-US" i="1">
+                        <a:latin typeface="Cambria Math" panose="02040503050406030204" pitchFamily="18" charset="0"/>
+                      </a:rPr>
+                      <m:t>∈</m:t>
+                    </m:r>
+                    <m:r>
+                      <a:rPr lang="en-US" i="1">
+                        <a:latin typeface="Cambria Math" panose="02040503050406030204" pitchFamily="18" charset="0"/>
+                      </a:rPr>
+                      <m:t>ℕ</m:t>
+                    </m:r>
+                    <m:r>
+                      <a:rPr lang="en-US" i="1">
+                        <a:latin typeface="Cambria Math" panose="02040503050406030204" pitchFamily="18" charset="0"/>
+                      </a:rPr>
+                      <m:t>:</m:t>
+                    </m:r>
+                    <m:r>
+                      <a:rPr lang="en-US" i="1">
+                        <a:latin typeface="Cambria Math" panose="02040503050406030204" pitchFamily="18" charset="0"/>
+                      </a:rPr>
+                      <m:t>𝑘</m:t>
+                    </m:r>
+                    <m:r>
+                      <a:rPr lang="en-US" i="1">
+                        <a:latin typeface="Cambria Math" panose="02040503050406030204" pitchFamily="18" charset="0"/>
+                      </a:rPr>
+                      <m:t>&gt;0</m:t>
+                    </m:r>
+                  </m:oMath>
+                </a14:m>
+                <a:endParaRPr lang="en-US" dirty="0"/>
+              </a:p>
+              <a:p>
+                <a:pPr lvl="2"/>
+                <a:r>
+                  <a:rPr lang="en-US" dirty="0"/>
+                  <a:t>Implies that the system has </a:t>
+                </a:r>
+                <a:r>
+                  <a:rPr lang="en-US" dirty="0" smtClean="0"/>
+                  <a:t>a </a:t>
+                </a:r>
+                <a:r>
+                  <a:rPr lang="en-US" b="1" dirty="0" smtClean="0"/>
+                  <a:t>finite buffer</a:t>
+                </a:r>
+                <a:endParaRPr lang="en-US" dirty="0" smtClean="0"/>
+              </a:p>
+              <a:p>
+                <a:pPr lvl="1"/>
+                <a:endParaRPr lang="en-US" dirty="0" smtClean="0"/>
+              </a:p>
+              <a:p>
+                <a:pPr lvl="1"/>
+                <a:endParaRPr lang="en-US" dirty="0"/>
+              </a:p>
+            </p:txBody>
+          </p:sp>
+        </mc:Choice>
+        <mc:Fallback>
+          <p:sp>
+            <p:nvSpPr>
+              <p:cNvPr id="3" name="Content Placeholder 2"/>
+              <p:cNvSpPr>
+                <a:spLocks noGrp="1" noRot="1" noChangeAspect="1" noMove="1" noResize="1" noEditPoints="1" noAdjustHandles="1" noChangeArrowheads="1" noChangeShapeType="1" noTextEdit="1"/>
+              </p:cNvSpPr>
+              <p:nvPr>
+                <p:ph idx="1"/>
+              </p:nvPr>
+            </p:nvSpPr>
+            <p:spPr>
+              <a:blipFill>
+                <a:blip r:embed="rId3"/>
+                <a:stretch>
+                  <a:fillRect l="-189" t="-1120" b="-14706"/>
+                </a:stretch>
+              </a:blipFill>
+            </p:spPr>
+            <p:txBody>
+              <a:bodyPr/>
+              <a:lstStyle/>
+              <a:p>
+                <a:r>
+                  <a:rPr lang="en-US">
+                    <a:noFill/>
+                  </a:rPr>
+                  <a:t> </a:t>
+                </a:r>
+              </a:p>
+            </p:txBody>
+          </p:sp>
+        </mc:Fallback>
+      </mc:AlternateContent>
       <p:sp>
         <p:nvSpPr>
           <p:cNvPr id="4" name="Slide Number Placeholder 3"/>

</xml_diff>

<commit_message>
finished off periodic analysis and updated some figures.
</commit_message>
<xml_diff>
--- a/thesis/Defense.pptx
+++ b/thesis/Defense.pptx
@@ -2537,11 +2537,7 @@
             </a:r>
             <a:r>
               <a:rPr lang="en-US" baseline="0" dirty="0" smtClean="0"/>
-              <a:t> addition to the period’s required </a:t>
-            </a:r>
-            <a:r>
-              <a:rPr lang="en-US" baseline="0" dirty="0" err="1" smtClean="0"/>
-              <a:t>trafffic</a:t>
+              <a:t> addition to the period’s required traffic</a:t>
             </a:r>
             <a:endParaRPr lang="en-US" dirty="0" smtClean="0"/>
           </a:p>
@@ -6823,12 +6819,102 @@
       </p:grpSpPr>
       <p:sp>
         <p:nvSpPr>
-          <p:cNvPr id="11" name="Title 10"/>
-          <p:cNvSpPr>
-            <a:spLocks noGrp="1"/>
-          </p:cNvSpPr>
-          <p:nvPr>
-            <p:ph type="title"/>
+          <p:cNvPr id="19" name="Rectangle 18"/>
+          <p:cNvSpPr/>
+          <p:nvPr/>
+        </p:nvSpPr>
+        <p:spPr>
+          <a:xfrm>
+            <a:off x="152402" y="2865526"/>
+            <a:ext cx="7772400" cy="2743199"/>
+          </a:xfrm>
+          <a:prstGeom prst="rect">
+            <a:avLst/>
+          </a:prstGeom>
+          <a:solidFill>
+            <a:schemeClr val="accent2">
+              <a:lumMod val="75000"/>
+            </a:schemeClr>
+          </a:solidFill>
+        </p:spPr>
+        <p:style>
+          <a:lnRef idx="2">
+            <a:schemeClr val="accent1">
+              <a:shade val="50000"/>
+            </a:schemeClr>
+          </a:lnRef>
+          <a:fillRef idx="1">
+            <a:schemeClr val="accent1"/>
+          </a:fillRef>
+          <a:effectRef idx="0">
+            <a:schemeClr val="accent1"/>
+          </a:effectRef>
+          <a:fontRef idx="minor">
+            <a:schemeClr val="lt1"/>
+          </a:fontRef>
+        </p:style>
+        <p:txBody>
+          <a:bodyPr rtlCol="0" anchor="ctr"/>
+          <a:lstStyle/>
+          <a:p>
+            <a:pPr algn="ctr"/>
+            <a:endParaRPr lang="en-US"/>
+          </a:p>
+        </p:txBody>
+      </p:sp>
+      <p:sp>
+        <p:nvSpPr>
+          <p:cNvPr id="18" name="Rectangle 17"/>
+          <p:cNvSpPr/>
+          <p:nvPr/>
+        </p:nvSpPr>
+        <p:spPr>
+          <a:xfrm>
+            <a:off x="152402" y="61960"/>
+            <a:ext cx="7772400" cy="2743199"/>
+          </a:xfrm>
+          <a:prstGeom prst="rect">
+            <a:avLst/>
+          </a:prstGeom>
+          <a:solidFill>
+            <a:schemeClr val="accent3">
+              <a:lumMod val="75000"/>
+            </a:schemeClr>
+          </a:solidFill>
+        </p:spPr>
+        <p:style>
+          <a:lnRef idx="2">
+            <a:schemeClr val="accent1">
+              <a:shade val="50000"/>
+            </a:schemeClr>
+          </a:lnRef>
+          <a:fillRef idx="1">
+            <a:schemeClr val="accent1"/>
+          </a:fillRef>
+          <a:effectRef idx="0">
+            <a:schemeClr val="accent1"/>
+          </a:effectRef>
+          <a:fontRef idx="minor">
+            <a:schemeClr val="lt1"/>
+          </a:fontRef>
+        </p:style>
+        <p:txBody>
+          <a:bodyPr rtlCol="0" anchor="ctr"/>
+          <a:lstStyle/>
+          <a:p>
+            <a:pPr algn="ctr"/>
+            <a:endParaRPr lang="en-US"/>
+          </a:p>
+        </p:txBody>
+      </p:sp>
+      <p:sp>
+        <p:nvSpPr>
+          <p:cNvPr id="4" name="Slide Number Placeholder 3"/>
+          <p:cNvSpPr>
+            <a:spLocks noGrp="1"/>
+          </p:cNvSpPr>
+          <p:nvPr>
+            <p:ph type="sldNum" sz="quarter" idx="12"/>
           </p:nvPr>
         </p:nvSpPr>
         <p:spPr/>
@@ -6836,17 +6922,23 @@
           <a:bodyPr/>
           <a:lstStyle/>
           <a:p>
+            <a:fld id="{4FAB73BC-B049-4115-A692-8D63A059BFB8}" type="slidenum">
+              <a:rPr lang="en-US" smtClean="0"/>
+              <a:t>13</a:t>
+            </a:fld>
             <a:endParaRPr lang="en-US" dirty="0"/>
           </a:p>
         </p:txBody>
       </p:sp>
       <p:pic>
         <p:nvPicPr>
-          <p:cNvPr id="9" name="Picture 8"/>
+          <p:cNvPr id="7" name="Content Placeholder 6"/>
           <p:cNvPicPr>
-            <a:picLocks noChangeAspect="1"/>
+            <a:picLocks noGrp="1" noChangeAspect="1"/>
           </p:cNvPicPr>
-          <p:nvPr/>
+          <p:nvPr>
+            <p:ph idx="1"/>
+          </p:nvPr>
         </p:nvPicPr>
         <p:blipFill>
           <a:blip r:embed="rId2" cstate="print">
@@ -6862,148 +6954,7 @@
         </p:blipFill>
         <p:spPr>
           <a:xfrm>
-            <a:off x="4481188" y="345847"/>
-            <a:ext cx="3367412" cy="2538000"/>
-          </a:xfrm>
-          <a:prstGeom prst="rect">
-            <a:avLst/>
-          </a:prstGeom>
-          <a:solidFill>
-            <a:srgbClr val="FFFFFF">
-              <a:shade val="85000"/>
-            </a:srgbClr>
-          </a:solidFill>
-          <a:ln w="88900" cap="sq">
-            <a:noFill/>
-            <a:miter lim="800000"/>
-          </a:ln>
-          <a:effectLst>
-            <a:outerShdw blurRad="55000" dist="18000" dir="5400000" algn="tl" rotWithShape="0">
-              <a:srgbClr val="000000">
-                <a:alpha val="40000"/>
-              </a:srgbClr>
-            </a:outerShdw>
-          </a:effectLst>
-          <a:scene3d>
-            <a:camera prst="orthographicFront"/>
-            <a:lightRig rig="twoPt" dir="t">
-              <a:rot lat="0" lon="0" rev="7200000"/>
-            </a:lightRig>
-          </a:scene3d>
-          <a:sp3d>
-            <a:bevelT w="25400" h="19050"/>
-            <a:contourClr>
-              <a:srgbClr val="FFFFFF"/>
-            </a:contourClr>
-          </a:sp3d>
-        </p:spPr>
-      </p:pic>
-      <p:sp>
-        <p:nvSpPr>
-          <p:cNvPr id="4" name="Slide Number Placeholder 3"/>
-          <p:cNvSpPr>
-            <a:spLocks noGrp="1"/>
-          </p:cNvSpPr>
-          <p:nvPr>
-            <p:ph type="sldNum" sz="quarter" idx="12"/>
-          </p:nvPr>
-        </p:nvSpPr>
-        <p:spPr/>
-        <p:txBody>
-          <a:bodyPr/>
-          <a:lstStyle/>
-          <a:p>
-            <a:fld id="{4FAB73BC-B049-4115-A692-8D63A059BFB8}" type="slidenum">
-              <a:rPr lang="en-US" smtClean="0"/>
-              <a:t>13</a:t>
-            </a:fld>
-            <a:endParaRPr lang="en-US" dirty="0"/>
-          </a:p>
-        </p:txBody>
-      </p:sp>
-      <p:pic>
-        <p:nvPicPr>
-          <p:cNvPr id="7" name="Content Placeholder 6"/>
-          <p:cNvPicPr>
-            <a:picLocks noGrp="1" noChangeAspect="1"/>
-          </p:cNvPicPr>
-          <p:nvPr>
-            <p:ph idx="1"/>
-          </p:nvPr>
-        </p:nvPicPr>
-        <p:blipFill>
-          <a:blip r:embed="rId3" cstate="print">
-            <a:extLst>
-              <a:ext uri="{28A0092B-C50C-407E-A947-70E740481C1C}">
-                <a14:useLocalDpi xmlns:a14="http://schemas.microsoft.com/office/drawing/2010/main" val="0"/>
-              </a:ext>
-            </a:extLst>
-          </a:blip>
-          <a:stretch>
-            <a:fillRect/>
-          </a:stretch>
-        </p:blipFill>
-        <p:spPr>
-          <a:xfrm>
-            <a:off x="4481188" y="2895600"/>
-            <a:ext cx="3367412" cy="2538000"/>
-          </a:xfrm>
-          <a:prstGeom prst="rect">
-            <a:avLst/>
-          </a:prstGeom>
-          <a:solidFill>
-            <a:srgbClr val="FFFFFF">
-              <a:shade val="85000"/>
-            </a:srgbClr>
-          </a:solidFill>
-          <a:ln w="88900" cap="sq">
-            <a:noFill/>
-            <a:miter lim="800000"/>
-          </a:ln>
-          <a:effectLst>
-            <a:outerShdw blurRad="55000" dist="18000" dir="5400000" algn="tl" rotWithShape="0">
-              <a:srgbClr val="000000">
-                <a:alpha val="40000"/>
-              </a:srgbClr>
-            </a:outerShdw>
-          </a:effectLst>
-          <a:scene3d>
-            <a:camera prst="orthographicFront"/>
-            <a:lightRig rig="twoPt" dir="t">
-              <a:rot lat="0" lon="0" rev="7200000"/>
-            </a:lightRig>
-          </a:scene3d>
-          <a:sp3d>
-            <a:bevelT w="25400" h="19050"/>
-            <a:contourClr>
-              <a:srgbClr val="FFFFFF"/>
-            </a:contourClr>
-          </a:sp3d>
-        </p:spPr>
-      </p:pic>
-      <p:pic>
-        <p:nvPicPr>
-          <p:cNvPr id="8" name="Picture 7"/>
-          <p:cNvPicPr>
-            <a:picLocks noChangeAspect="1"/>
-          </p:cNvPicPr>
-          <p:nvPr/>
-        </p:nvPicPr>
-        <p:blipFill>
-          <a:blip r:embed="rId4" cstate="print">
-            <a:extLst>
-              <a:ext uri="{28A0092B-C50C-407E-A947-70E740481C1C}">
-                <a14:useLocalDpi xmlns:a14="http://schemas.microsoft.com/office/drawing/2010/main" val="0"/>
-              </a:ext>
-            </a:extLst>
-          </a:blip>
-          <a:stretch>
-            <a:fillRect/>
-          </a:stretch>
-        </p:blipFill>
-        <p:spPr>
-          <a:xfrm>
-            <a:off x="951864" y="345847"/>
+            <a:off x="4481189" y="2956966"/>
             <a:ext cx="3367412" cy="2538000"/>
           </a:xfrm>
           <a:prstGeom prst="rect">
@@ -7048,6 +6999,168 @@
           <p:nvPr/>
         </p:nvPicPr>
         <p:blipFill>
+          <a:blip r:embed="rId3" cstate="print">
+            <a:extLst>
+              <a:ext uri="{28A0092B-C50C-407E-A947-70E740481C1C}">
+                <a14:useLocalDpi xmlns:a14="http://schemas.microsoft.com/office/drawing/2010/main" val="0"/>
+              </a:ext>
+            </a:extLst>
+          </a:blip>
+          <a:stretch>
+            <a:fillRect/>
+          </a:stretch>
+        </p:blipFill>
+        <p:spPr>
+          <a:xfrm>
+            <a:off x="1066801" y="2956966"/>
+            <a:ext cx="3367411" cy="2538000"/>
+          </a:xfrm>
+          <a:prstGeom prst="rect">
+            <a:avLst/>
+          </a:prstGeom>
+          <a:solidFill>
+            <a:srgbClr val="FFFFFF">
+              <a:shade val="85000"/>
+            </a:srgbClr>
+          </a:solidFill>
+          <a:ln w="88900" cap="sq">
+            <a:noFill/>
+            <a:miter lim="800000"/>
+          </a:ln>
+          <a:effectLst>
+            <a:outerShdw blurRad="55000" dist="18000" dir="5400000" algn="tl" rotWithShape="0">
+              <a:srgbClr val="000000">
+                <a:alpha val="40000"/>
+              </a:srgbClr>
+            </a:outerShdw>
+          </a:effectLst>
+          <a:scene3d>
+            <a:camera prst="orthographicFront"/>
+            <a:lightRig rig="twoPt" dir="t">
+              <a:rot lat="0" lon="0" rev="7200000"/>
+            </a:lightRig>
+          </a:scene3d>
+          <a:sp3d>
+            <a:bevelT w="25400" h="19050"/>
+            <a:contourClr>
+              <a:srgbClr val="FFFFFF"/>
+            </a:contourClr>
+          </a:sp3d>
+        </p:spPr>
+      </p:pic>
+      <p:pic>
+        <p:nvPicPr>
+          <p:cNvPr id="9" name="Picture 8"/>
+          <p:cNvPicPr>
+            <a:picLocks noChangeAspect="1"/>
+          </p:cNvPicPr>
+          <p:nvPr/>
+        </p:nvPicPr>
+        <p:blipFill>
+          <a:blip r:embed="rId4" cstate="print">
+            <a:extLst>
+              <a:ext uri="{28A0092B-C50C-407E-A947-70E740481C1C}">
+                <a14:useLocalDpi xmlns:a14="http://schemas.microsoft.com/office/drawing/2010/main" val="0"/>
+              </a:ext>
+            </a:extLst>
+          </a:blip>
+          <a:stretch>
+            <a:fillRect/>
+          </a:stretch>
+        </p:blipFill>
+        <p:spPr>
+          <a:xfrm>
+            <a:off x="4481189" y="179207"/>
+            <a:ext cx="3367412" cy="2538000"/>
+          </a:xfrm>
+          <a:prstGeom prst="rect">
+            <a:avLst/>
+          </a:prstGeom>
+          <a:solidFill>
+            <a:srgbClr val="FFFFFF">
+              <a:shade val="85000"/>
+            </a:srgbClr>
+          </a:solidFill>
+          <a:ln w="88900" cap="sq">
+            <a:noFill/>
+            <a:miter lim="800000"/>
+          </a:ln>
+          <a:effectLst>
+            <a:outerShdw blurRad="55000" dist="18000" dir="5400000" algn="tl" rotWithShape="0">
+              <a:srgbClr val="000000">
+                <a:alpha val="40000"/>
+              </a:srgbClr>
+            </a:outerShdw>
+          </a:effectLst>
+          <a:scene3d>
+            <a:camera prst="orthographicFront"/>
+            <a:lightRig rig="twoPt" dir="t">
+              <a:rot lat="0" lon="0" rev="7200000"/>
+            </a:lightRig>
+          </a:scene3d>
+          <a:sp3d>
+            <a:bevelT w="25400" h="19050"/>
+            <a:contourClr>
+              <a:srgbClr val="FFFFFF"/>
+            </a:contourClr>
+          </a:sp3d>
+        </p:spPr>
+      </p:pic>
+      <p:sp>
+        <p:nvSpPr>
+          <p:cNvPr id="12" name="TextBox 11"/>
+          <p:cNvSpPr txBox="1"/>
+          <p:nvPr/>
+        </p:nvSpPr>
+        <p:spPr>
+          <a:xfrm>
+            <a:off x="225648" y="1227822"/>
+            <a:ext cx="764953" cy="369332"/>
+          </a:xfrm>
+          <a:prstGeom prst="rect">
+            <a:avLst/>
+          </a:prstGeom>
+          <a:noFill/>
+        </p:spPr>
+        <p:txBody>
+          <a:bodyPr wrap="none" rtlCol="0">
+            <a:spAutoFit/>
+          </a:bodyPr>
+          <a:lstStyle/>
+          <a:p>
+            <a:r>
+              <a:rPr lang="en-US" dirty="0" smtClean="0">
+                <a:solidFill>
+                  <a:schemeClr val="bg1"/>
+                </a:solidFill>
+              </a:rPr>
+              <a:t>PNP</a:t>
+            </a:r>
+            <a:r>
+              <a:rPr lang="en-US" baseline="30000" dirty="0" smtClean="0">
+                <a:solidFill>
+                  <a:schemeClr val="bg1"/>
+                </a:solidFill>
+              </a:rPr>
+              <a:t>2</a:t>
+            </a:r>
+            <a:endParaRPr lang="en-US" dirty="0">
+              <a:solidFill>
+                <a:schemeClr val="bg1"/>
+              </a:solidFill>
+            </a:endParaRPr>
+          </a:p>
+        </p:txBody>
+      </p:sp>
+      <p:pic>
+        <p:nvPicPr>
+          <p:cNvPr id="8" name="Picture 7"/>
+          <p:cNvPicPr>
+            <a:picLocks noChangeAspect="1"/>
+          </p:cNvPicPr>
+          <p:nvPr/>
+        </p:nvPicPr>
+        <p:blipFill>
           <a:blip r:embed="rId5" cstate="print">
             <a:extLst>
               <a:ext uri="{28A0092B-C50C-407E-A947-70E740481C1C}">
@@ -7061,8 +7174,8 @@
         </p:blipFill>
         <p:spPr>
           <a:xfrm>
-            <a:off x="951863" y="2895600"/>
-            <a:ext cx="3367411" cy="2538000"/>
+            <a:off x="1066801" y="179207"/>
+            <a:ext cx="3367412" cy="2538000"/>
           </a:xfrm>
           <a:prstGeom prst="rect">
             <a:avLst/>
@@ -7108,13 +7221,13 @@
               <p:nvPr>
                 <p:extLst>
                   <p:ext uri="{D42A27DB-BD31-4B8C-83A1-F6EECF244321}">
-                    <p14:modId xmlns:p14="http://schemas.microsoft.com/office/powerpoint/2010/main" val="2596799893"/>
+                    <p14:modId xmlns:p14="http://schemas.microsoft.com/office/powerpoint/2010/main" val="1903668656"/>
                   </p:ext>
                 </p:extLst>
               </p:nvPr>
             </p:nvGraphicFramePr>
             <p:xfrm>
-              <a:off x="1066800" y="5455920"/>
+              <a:off x="694373" y="5688966"/>
               <a:ext cx="6688456" cy="1097280"/>
             </p:xfrm>
             <a:graphic>
@@ -7463,13 +7576,13 @@
               <p:nvPr>
                 <p:extLst>
                   <p:ext uri="{D42A27DB-BD31-4B8C-83A1-F6EECF244321}">
-                    <p14:modId xmlns:p14="http://schemas.microsoft.com/office/powerpoint/2010/main" val="2596799893"/>
+                    <p14:modId xmlns:p14="http://schemas.microsoft.com/office/powerpoint/2010/main" val="1903668656"/>
                   </p:ext>
                 </p:extLst>
               </p:nvPr>
             </p:nvGraphicFramePr>
             <p:xfrm>
-              <a:off x="1066800" y="5455920"/>
+              <a:off x="694373" y="5688966"/>
               <a:ext cx="6688456" cy="1097280"/>
             </p:xfrm>
             <a:graphic>
@@ -7566,7 +7679,7 @@
                         <a:blipFill>
                           <a:blip r:embed="rId6"/>
                           <a:stretch>
-                            <a:fillRect l="-301460" t="-4444" r="-1460" b="-317778"/>
+                            <a:fillRect l="-300000" t="-2222" r="-1455" b="-317778"/>
                           </a:stretch>
                         </a:blipFill>
                       </a:tcPr>
@@ -7783,47 +7896,13 @@
       </mc:AlternateContent>
       <p:sp>
         <p:nvSpPr>
-          <p:cNvPr id="12" name="TextBox 11"/>
-          <p:cNvSpPr txBox="1"/>
-          <p:nvPr/>
-        </p:nvSpPr>
-        <p:spPr>
-          <a:xfrm>
-            <a:off x="152400" y="1430181"/>
-            <a:ext cx="764953" cy="369332"/>
-          </a:xfrm>
-          <a:prstGeom prst="rect">
-            <a:avLst/>
-          </a:prstGeom>
-          <a:noFill/>
-        </p:spPr>
-        <p:txBody>
-          <a:bodyPr wrap="none" rtlCol="0">
-            <a:spAutoFit/>
-          </a:bodyPr>
-          <a:lstStyle/>
-          <a:p>
-            <a:r>
-              <a:rPr lang="en-US" dirty="0" smtClean="0"/>
-              <a:t>PNP</a:t>
-            </a:r>
-            <a:r>
-              <a:rPr lang="en-US" baseline="30000" dirty="0" smtClean="0"/>
-              <a:t>2</a:t>
-            </a:r>
-            <a:endParaRPr lang="en-US" dirty="0"/>
-          </a:p>
-        </p:txBody>
-      </p:sp>
-      <p:sp>
-        <p:nvSpPr>
           <p:cNvPr id="13" name="TextBox 12"/>
           <p:cNvSpPr txBox="1"/>
           <p:nvPr/>
         </p:nvSpPr>
         <p:spPr>
           <a:xfrm>
-            <a:off x="265411" y="3979934"/>
+            <a:off x="338659" y="4041300"/>
             <a:ext cx="538930" cy="369332"/>
           </a:xfrm>
           <a:prstGeom prst="rect">
@@ -7838,10 +7917,18 @@
           <a:lstStyle/>
           <a:p>
             <a:r>
-              <a:rPr lang="en-US" dirty="0" smtClean="0"/>
+              <a:rPr lang="en-US" dirty="0" smtClean="0">
+                <a:solidFill>
+                  <a:schemeClr val="bg1"/>
+                </a:solidFill>
+              </a:rPr>
               <a:t>NC</a:t>
             </a:r>
-            <a:endParaRPr lang="en-US" dirty="0"/>
+            <a:endParaRPr lang="en-US" dirty="0">
+              <a:solidFill>
+                <a:schemeClr val="bg1"/>
+              </a:solidFill>
+            </a:endParaRPr>
           </a:p>
         </p:txBody>
       </p:sp>
@@ -7901,7 +7988,7 @@
           <a:p>
             <a:r>
               <a:rPr lang="en-US" dirty="0" smtClean="0"/>
-              <a:t>Analysis of Periodic Systems (1/5)</a:t>
+              <a:t>Analysis of Periodic Systems (1/5) : Overview</a:t>
             </a:r>
             <a:endParaRPr lang="en-US" dirty="0"/>
           </a:p>
@@ -7924,7 +8011,52 @@
           </a:bodyPr>
           <a:lstStyle/>
           <a:p>
-            <a:endParaRPr lang="en-US" dirty="0" smtClean="0"/>
+            <a:r>
+              <a:rPr lang="en-US" dirty="0" smtClean="0"/>
+              <a:t>Many systems </a:t>
+            </a:r>
+            <a:r>
+              <a:rPr lang="en-US" dirty="0" smtClean="0"/>
+              <a:t>exhibit some form of periodicity, where a system is periodic if the data production, service, or consumption (p/s/r) rate is a periodic function of time</a:t>
+            </a:r>
+          </a:p>
+          <a:p>
+            <a:pPr lvl="1"/>
+            <a:r>
+              <a:rPr lang="en-US" dirty="0" smtClean="0"/>
+              <a:t>Time-integral of periodic data rates is the cumulative data (p/s/r) rate in the system.  These cumulative functions are called </a:t>
+            </a:r>
+            <a:r>
+              <a:rPr lang="en-US" b="1" dirty="0" smtClean="0"/>
+              <a:t>repeating</a:t>
+            </a:r>
+            <a:r>
+              <a:rPr lang="en-US" dirty="0" smtClean="0"/>
+              <a:t> functions.  </a:t>
+            </a:r>
+          </a:p>
+          <a:p>
+            <a:r>
+              <a:rPr lang="en-US" dirty="0" smtClean="0"/>
+              <a:t>We wish to analyze the behavior of the system, specifically by looking at the outputs in the system</a:t>
+            </a:r>
+          </a:p>
+          <a:p>
+            <a:pPr lvl="1"/>
+            <a:r>
+              <a:rPr lang="en-US" dirty="0" smtClean="0"/>
+              <a:t>If we show that the system’s outputs exhibit periodicity, we can show that the system has </a:t>
+            </a:r>
+            <a:r>
+              <a:rPr lang="en-US" b="1" dirty="0" smtClean="0"/>
+              <a:t>no unbounded buffer growth</a:t>
+            </a:r>
+          </a:p>
+          <a:p>
+            <a:r>
+              <a:rPr lang="en-US" dirty="0" smtClean="0"/>
+              <a:t>We will examine two periodic systems and analyze how their behavior changes over the course of two periods.  </a:t>
+            </a:r>
           </a:p>
         </p:txBody>
       </p:sp>
@@ -8149,7 +8281,7 @@
           <a:p>
             <a:r>
               <a:rPr lang="en-US" dirty="0" smtClean="0"/>
-              <a:t>Analysis of Periodic Systems (2/5)</a:t>
+              <a:t>Analysis of Periodic Systems (2/5) : System 1</a:t>
             </a:r>
             <a:endParaRPr lang="en-US" dirty="0"/>
           </a:p>
@@ -8353,7 +8485,7 @@
           <a:p>
             <a:r>
               <a:rPr lang="en-US" dirty="0" smtClean="0"/>
-              <a:t>Analysis of Periodic Systems (3/5)</a:t>
+              <a:t>Analysis of Periodic Systems (3/5): System 2</a:t>
             </a:r>
             <a:endParaRPr lang="en-US" dirty="0"/>
           </a:p>
@@ -8415,7 +8547,7 @@
           <a:p>
             <a:r>
               <a:rPr lang="en-US" dirty="0" smtClean="0"/>
-              <a:t>Analysis of Periodic Systems (4/5)</a:t>
+              <a:t>Analysis of Periodic Systems (4/5): Formal Definitions</a:t>
             </a:r>
             <a:endParaRPr lang="en-US" dirty="0"/>
           </a:p>
@@ -9460,7 +9592,7 @@
           <a:p>
             <a:r>
               <a:rPr lang="en-US" dirty="0" smtClean="0"/>
-              <a:t>Analysis of Periodic Systems (5/5)</a:t>
+              <a:t>Analysis of Periodic Systems (5/5): Stability Analysis</a:t>
             </a:r>
             <a:endParaRPr lang="en-US" dirty="0"/>
           </a:p>
@@ -9936,10 +10068,22 @@
                       </m:e>
                     </m:d>
                     <m:r>
+                      <a:rPr lang="en-US" i="1" smtClean="0">
+                        <a:latin typeface="Cambria Math" panose="02040503050406030204" pitchFamily="18" charset="0"/>
+                      </a:rPr>
+                      <m:t>, </m:t>
+                    </m:r>
+                    <m:r>
+                      <a:rPr lang="en-US" b="0" i="1" smtClean="0">
+                        <a:latin typeface="Cambria Math" panose="02040503050406030204" pitchFamily="18" charset="0"/>
+                      </a:rPr>
+                      <m:t> </m:t>
+                    </m:r>
+                    <m:r>
                       <a:rPr lang="en-US" i="1">
                         <a:latin typeface="Cambria Math" panose="02040503050406030204" pitchFamily="18" charset="0"/>
                       </a:rPr>
-                      <m:t>, ∀</m:t>
+                      <m:t>∀</m:t>
                     </m:r>
                     <m:r>
                       <a:rPr lang="en-US" i="1">
@@ -10102,7 +10246,7 @@
                       <a:rPr lang="en-US" b="0" i="1" smtClean="0">
                         <a:latin typeface="Cambria Math" panose="02040503050406030204" pitchFamily="18" charset="0"/>
                       </a:rPr>
-                      <m:t>,∀</m:t>
+                      <m:t>,     ∀</m:t>
                     </m:r>
                     <m:r>
                       <a:rPr lang="en-US" b="0" i="1" smtClean="0">
@@ -10148,7 +10292,7 @@
                 <a:pPr lvl="2"/>
                 <a:r>
                   <a:rPr lang="en-US" dirty="0" smtClean="0"/>
-                  <a:t>Implies that the system has </a:t>
+                  <a:t>Therefore the system has </a:t>
                 </a:r>
                 <a:r>
                   <a:rPr lang="en-US" b="1" dirty="0" smtClean="0"/>
@@ -10571,7 +10715,19 @@
                       <a:rPr lang="en-US" i="1">
                         <a:latin typeface="Cambria Math" panose="02040503050406030204" pitchFamily="18" charset="0"/>
                       </a:rPr>
-                      <m:t>, ∀</m:t>
+                      <m:t>, </m:t>
+                    </m:r>
+                    <m:r>
+                      <a:rPr lang="en-US" b="0" i="1" smtClean="0">
+                        <a:latin typeface="Cambria Math" panose="02040503050406030204" pitchFamily="18" charset="0"/>
+                      </a:rPr>
+                      <m:t> </m:t>
+                    </m:r>
+                    <m:r>
+                      <a:rPr lang="en-US" i="1">
+                        <a:latin typeface="Cambria Math" panose="02040503050406030204" pitchFamily="18" charset="0"/>
+                      </a:rPr>
+                      <m:t>∀</m:t>
                     </m:r>
                     <m:r>
                       <a:rPr lang="en-US" i="1">
@@ -10734,7 +10890,19 @@
                       <a:rPr lang="en-US" i="1">
                         <a:latin typeface="Cambria Math" panose="02040503050406030204" pitchFamily="18" charset="0"/>
                       </a:rPr>
-                      <m:t>,∀</m:t>
+                      <m:t>,</m:t>
+                    </m:r>
+                    <m:r>
+                      <a:rPr lang="en-US" b="0" i="1" smtClean="0">
+                        <a:latin typeface="Cambria Math" panose="02040503050406030204" pitchFamily="18" charset="0"/>
+                      </a:rPr>
+                      <m:t>     </m:t>
+                    </m:r>
+                    <m:r>
+                      <a:rPr lang="en-US" i="1">
+                        <a:latin typeface="Cambria Math" panose="02040503050406030204" pitchFamily="18" charset="0"/>
+                      </a:rPr>
+                      <m:t>∀</m:t>
                     </m:r>
                     <m:r>
                       <a:rPr lang="en-US" i="1">
@@ -10779,8 +10947,12 @@
               <a:p>
                 <a:pPr lvl="2"/>
                 <a:r>
+                  <a:rPr lang="en-US" dirty="0" smtClean="0"/>
+                  <a:t>Therefore the </a:t>
+                </a:r>
+                <a:r>
                   <a:rPr lang="en-US" dirty="0"/>
-                  <a:t>Implies that the system has </a:t>
+                  <a:t>system has </a:t>
                 </a:r>
                 <a:r>
                   <a:rPr lang="en-US" dirty="0" smtClean="0"/>

</xml_diff>

<commit_message>
updated slides about tdma
</commit_message>
<xml_diff>
--- a/thesis/Defense.pptx
+++ b/thesis/Defense.pptx
@@ -30,11 +30,11 @@
     <p:sldId id="364" r:id="rId18"/>
     <p:sldId id="365" r:id="rId19"/>
     <p:sldId id="366" r:id="rId20"/>
-    <p:sldId id="367" r:id="rId21"/>
-    <p:sldId id="368" r:id="rId22"/>
-    <p:sldId id="369" r:id="rId23"/>
-    <p:sldId id="356" r:id="rId24"/>
-    <p:sldId id="351" r:id="rId25"/>
+    <p:sldId id="370" r:id="rId21"/>
+    <p:sldId id="367" r:id="rId22"/>
+    <p:sldId id="368" r:id="rId23"/>
+    <p:sldId id="369" r:id="rId24"/>
+    <p:sldId id="356" r:id="rId25"/>
     <p:sldId id="352" r:id="rId26"/>
     <p:sldId id="357" r:id="rId27"/>
     <p:sldId id="358" r:id="rId28"/>
@@ -874,26 +874,13 @@
           <a:p>
             <a:r>
               <a:rPr lang="en-US" dirty="0" smtClean="0"/>
-              <a:t>Need to mention how we measure buffer space requirements: using Linux’s built-in measurement tools</a:t>
-            </a:r>
-          </a:p>
-          <a:p>
-            <a:endParaRPr lang="en-US" dirty="0" smtClean="0"/>
-          </a:p>
-          <a:p>
-            <a:r>
-              <a:rPr lang="en-US" dirty="0" smtClean="0"/>
-              <a:t>Model same application with RTC and </a:t>
-            </a:r>
-            <a:r>
-              <a:rPr lang="en-US" dirty="0" smtClean="0"/>
-              <a:t>PNP</a:t>
-            </a:r>
-            <a:r>
-              <a:rPr lang="en-US" baseline="30000" dirty="0" smtClean="0"/>
-              <a:t>2</a:t>
-            </a:r>
-            <a:endParaRPr lang="en-US" dirty="0" smtClean="0"/>
+              <a:t>These formulas remove</a:t>
+            </a:r>
+            <a:r>
+              <a:rPr lang="en-US" baseline="0" dirty="0" smtClean="0"/>
+              <a:t> the need to explicitly incorporate TDMA into the system model when modeling/analyzing the system</a:t>
+            </a:r>
+            <a:endParaRPr lang="en-US" dirty="0"/>
           </a:p>
         </p:txBody>
       </p:sp>
@@ -915,7 +902,7 @@
             <a:fld id="{BF235529-9E21-485D-85D0-B510246CE809}" type="slidenum">
               <a:rPr lang="en-US" smtClean="0"/>
               <a:pPr/>
-              <a:t>24</a:t>
+              <a:t>20</a:t>
             </a:fld>
             <a:endParaRPr lang="en-US"/>
           </a:p>
@@ -924,7 +911,7 @@
     </p:spTree>
     <p:extLst>
       <p:ext uri="{BB962C8B-B14F-4D97-AF65-F5344CB8AC3E}">
-        <p14:creationId xmlns:p14="http://schemas.microsoft.com/office/powerpoint/2010/main" val="222063346"/>
+        <p14:creationId xmlns:p14="http://schemas.microsoft.com/office/powerpoint/2010/main" val="981177030"/>
       </p:ext>
     </p:extLst>
   </p:cSld>
@@ -11199,107 +11186,344 @@
           </a:p>
         </p:txBody>
       </p:sp>
-      <p:sp>
-        <p:nvSpPr>
-          <p:cNvPr id="3" name="Content Placeholder 2"/>
-          <p:cNvSpPr>
-            <a:spLocks noGrp="1"/>
-          </p:cNvSpPr>
-          <p:nvPr>
-            <p:ph idx="1"/>
-          </p:nvPr>
-        </p:nvSpPr>
-        <p:spPr/>
-        <p:txBody>
-          <a:bodyPr>
-            <a:normAutofit lnSpcReduction="10000"/>
-          </a:bodyPr>
-          <a:lstStyle/>
-          <a:p>
-            <a:r>
-              <a:rPr lang="en-US" dirty="0" smtClean="0"/>
-              <a:t>Validated the accuracy of PNP</a:t>
-            </a:r>
-            <a:r>
-              <a:rPr lang="en-US" baseline="30000" dirty="0" smtClean="0"/>
-              <a:t>2</a:t>
-            </a:r>
-            <a:r>
-              <a:rPr lang="en-US" dirty="0" smtClean="0"/>
-              <a:t> predictions using custom network traffic generation code and a network testbed</a:t>
-            </a:r>
-          </a:p>
-          <a:p>
-            <a:pPr lvl="1"/>
-            <a:r>
-              <a:rPr lang="en-US" dirty="0" smtClean="0"/>
-              <a:t>Used </a:t>
-            </a:r>
-            <a:r>
-              <a:rPr lang="en-US" dirty="0" err="1" smtClean="0"/>
-              <a:t>Dummynet</a:t>
-            </a:r>
-            <a:r>
-              <a:rPr lang="en-US" dirty="0" smtClean="0"/>
-              <a:t> to perform traffic shaping and link emulation</a:t>
-            </a:r>
-          </a:p>
-          <a:p>
-            <a:r>
-              <a:rPr lang="en-US" dirty="0" smtClean="0"/>
-              <a:t>Integrated Network Calculus model into PNP</a:t>
-            </a:r>
-            <a:r>
-              <a:rPr lang="en-US" baseline="30000" dirty="0" smtClean="0"/>
-              <a:t>2</a:t>
-            </a:r>
-            <a:r>
-              <a:rPr lang="en-US" dirty="0" smtClean="0"/>
-              <a:t> tool, allows analysis of PNP</a:t>
-            </a:r>
-            <a:r>
-              <a:rPr lang="en-US" baseline="30000" dirty="0" smtClean="0"/>
-              <a:t>2</a:t>
-            </a:r>
-            <a:r>
-              <a:rPr lang="en-US" dirty="0" smtClean="0"/>
-              <a:t> model using NC’s semantics</a:t>
-            </a:r>
-          </a:p>
-          <a:p>
-            <a:pPr lvl="1"/>
-            <a:r>
-              <a:rPr lang="en-US" dirty="0" smtClean="0"/>
-              <a:t>Enables direct, easy comparison between analysis techniques</a:t>
-            </a:r>
-          </a:p>
-          <a:p>
-            <a:r>
-              <a:rPr lang="en-US" dirty="0" smtClean="0"/>
-              <a:t>Network Calculus defines arrival curves and service curves as functions of time-window size, therefore it cannot precisely analyze systems where the applications’ data production is tightly coupled with the service capacity of the system</a:t>
-            </a:r>
-          </a:p>
-          <a:p>
-            <a:pPr lvl="1"/>
-            <a:r>
-              <a:rPr lang="en-US" dirty="0" smtClean="0"/>
-              <a:t>i.e. applications know a </a:t>
-            </a:r>
-            <a:r>
-              <a:rPr lang="en-US" dirty="0" err="1" smtClean="0"/>
-              <a:t>prioi</a:t>
-            </a:r>
-            <a:r>
-              <a:rPr lang="en-US" dirty="0" smtClean="0"/>
-              <a:t> when the system will have high network capacity and are designed to send their data at that time</a:t>
-            </a:r>
-          </a:p>
-          <a:p>
-            <a:pPr lvl="1"/>
-            <a:endParaRPr lang="en-US" b="1" dirty="0" smtClean="0"/>
-          </a:p>
-        </p:txBody>
-      </p:sp>
+      <mc:AlternateContent xmlns:mc="http://schemas.openxmlformats.org/markup-compatibility/2006">
+        <mc:Choice xmlns:a14="http://schemas.microsoft.com/office/drawing/2010/main" Requires="a14">
+          <p:sp>
+            <p:nvSpPr>
+              <p:cNvPr id="3" name="Content Placeholder 2"/>
+              <p:cNvSpPr>
+                <a:spLocks noGrp="1"/>
+              </p:cNvSpPr>
+              <p:nvPr>
+                <p:ph idx="1"/>
+              </p:nvPr>
+            </p:nvSpPr>
+            <p:spPr/>
+            <p:txBody>
+              <a:bodyPr>
+                <a:normAutofit fontScale="77500" lnSpcReduction="20000"/>
+              </a:bodyPr>
+              <a:lstStyle/>
+              <a:p>
+                <a:r>
+                  <a:rPr lang="en-US" dirty="0" smtClean="0"/>
+                  <a:t>Time Division Multiple Access (TDMA) is a Medium Access Control (MAC) protocol designed to minimize the number of packet collisions</a:t>
+                </a:r>
+              </a:p>
+              <a:p>
+                <a:pPr lvl="1"/>
+                <a:r>
+                  <a:rPr lang="en-US" dirty="0" smtClean="0"/>
+                  <a:t>Allocates time slices to each transmitter during which only they are allowed to send</a:t>
+                </a:r>
+              </a:p>
+              <a:p>
+                <a:pPr lvl="1"/>
+                <a:r>
+                  <a:rPr lang="en-US" dirty="0" smtClean="0"/>
+                  <a:t>The sequence of time slices repeats with a certain period</a:t>
+                </a:r>
+              </a:p>
+              <a:p>
+                <a:pPr lvl="1"/>
+                <a:r>
+                  <a:rPr lang="en-US" dirty="0" smtClean="0"/>
+                  <a:t>The MAC layer protocol can affect the performance of the application adversely and so must be taken into account when analyzing the system</a:t>
+                </a:r>
+              </a:p>
+              <a:p>
+                <a:r>
+                  <a:rPr lang="en-US" dirty="0" smtClean="0"/>
+                  <a:t>By integrating such low-level protocol behavior models into the system model, we can more precisely predict the performance of the applications on the system</a:t>
+                </a:r>
+              </a:p>
+              <a:p>
+                <a:r>
+                  <a:rPr lang="en-US" dirty="0" smtClean="0"/>
+                  <a:t>Given:</a:t>
+                </a:r>
+              </a:p>
+              <a:p>
+                <a:pPr lvl="1"/>
+                <a14:m>
+                  <m:oMath xmlns:m="http://schemas.openxmlformats.org/officeDocument/2006/math">
+                    <m:r>
+                      <a:rPr lang="en-US" b="0" i="1" smtClean="0">
+                        <a:latin typeface="Cambria Math" panose="02040503050406030204" pitchFamily="18" charset="0"/>
+                      </a:rPr>
+                      <m:t>𝑇</m:t>
+                    </m:r>
+                  </m:oMath>
+                </a14:m>
+                <a:r>
+                  <a:rPr lang="en-US" dirty="0" smtClean="0"/>
+                  <a:t>: the period of the TDMA schedule</a:t>
+                </a:r>
+              </a:p>
+              <a:p>
+                <a:pPr lvl="1"/>
+                <a14:m>
+                  <m:oMath xmlns:m="http://schemas.openxmlformats.org/officeDocument/2006/math">
+                    <m:sSub>
+                      <m:sSubPr>
+                        <m:ctrlPr>
+                          <a:rPr lang="en-US" i="1" smtClean="0">
+                            <a:latin typeface="Cambria Math" panose="02040503050406030204" pitchFamily="18" charset="0"/>
+                          </a:rPr>
+                        </m:ctrlPr>
+                      </m:sSubPr>
+                      <m:e>
+                        <m:r>
+                          <a:rPr lang="en-US" b="0" i="1" smtClean="0">
+                            <a:latin typeface="Cambria Math" panose="02040503050406030204" pitchFamily="18" charset="0"/>
+                          </a:rPr>
+                          <m:t>𝑡</m:t>
+                        </m:r>
+                      </m:e>
+                      <m:sub>
+                        <m:r>
+                          <a:rPr lang="en-US" b="0" i="1" smtClean="0">
+                            <a:latin typeface="Cambria Math" panose="02040503050406030204" pitchFamily="18" charset="0"/>
+                          </a:rPr>
+                          <m:t>𝑛</m:t>
+                        </m:r>
+                      </m:sub>
+                    </m:sSub>
+                  </m:oMath>
+                </a14:m>
+                <a:r>
+                  <a:rPr lang="en-US" dirty="0" smtClean="0"/>
+                  <a:t>: the duration of node </a:t>
+                </a:r>
+                <a14:m>
+                  <m:oMath xmlns:m="http://schemas.openxmlformats.org/officeDocument/2006/math">
+                    <m:r>
+                      <a:rPr lang="en-US" b="0" i="1" smtClean="0">
+                        <a:latin typeface="Cambria Math" panose="02040503050406030204" pitchFamily="18" charset="0"/>
+                      </a:rPr>
+                      <m:t>𝑛</m:t>
+                    </m:r>
+                  </m:oMath>
+                </a14:m>
+                <a:r>
+                  <a:rPr lang="en-US" dirty="0" smtClean="0"/>
+                  <a:t>’s TDMA slot</a:t>
+                </a:r>
+              </a:p>
+              <a:p>
+                <a:pPr lvl="1"/>
+                <a14:m>
+                  <m:oMath xmlns:m="http://schemas.openxmlformats.org/officeDocument/2006/math">
+                    <m:sSub>
+                      <m:sSubPr>
+                        <m:ctrlPr>
+                          <a:rPr lang="en-US" i="1" smtClean="0">
+                            <a:latin typeface="Cambria Math" panose="02040503050406030204" pitchFamily="18" charset="0"/>
+                          </a:rPr>
+                        </m:ctrlPr>
+                      </m:sSubPr>
+                      <m:e>
+                        <m:r>
+                          <a:rPr lang="en-US" b="0" i="1" smtClean="0">
+                            <a:latin typeface="Cambria Math" panose="02040503050406030204" pitchFamily="18" charset="0"/>
+                          </a:rPr>
+                          <m:t>𝑏𝑤</m:t>
+                        </m:r>
+                      </m:e>
+                      <m:sub>
+                        <m:r>
+                          <a:rPr lang="en-US" b="0" i="1" smtClean="0">
+                            <a:latin typeface="Cambria Math" panose="02040503050406030204" pitchFamily="18" charset="0"/>
+                          </a:rPr>
+                          <m:t>𝑛</m:t>
+                        </m:r>
+                      </m:sub>
+                    </m:sSub>
+                  </m:oMath>
+                </a14:m>
+                <a:r>
+                  <a:rPr lang="en-US" dirty="0" smtClean="0"/>
+                  <a:t>: the bandwidth available to node </a:t>
+                </a:r>
+                <a14:m>
+                  <m:oMath xmlns:m="http://schemas.openxmlformats.org/officeDocument/2006/math">
+                    <m:r>
+                      <a:rPr lang="en-US" b="0" i="1" smtClean="0">
+                        <a:latin typeface="Cambria Math" panose="02040503050406030204" pitchFamily="18" charset="0"/>
+                      </a:rPr>
+                      <m:t>𝑛</m:t>
+                    </m:r>
+                  </m:oMath>
+                </a14:m>
+                <a:r>
+                  <a:rPr lang="en-US" dirty="0" smtClean="0"/>
+                  <a:t> during its slot</a:t>
+                </a:r>
+              </a:p>
+              <a:p>
+                <a:r>
+                  <a:rPr lang="en-US" dirty="0" smtClean="0"/>
+                  <a:t>We calculate:</a:t>
+                </a:r>
+              </a:p>
+              <a:p>
+                <a:pPr lvl="1"/>
+                <a14:m>
+                  <m:oMath xmlns:m="http://schemas.openxmlformats.org/officeDocument/2006/math">
+                    <m:sSub>
+                      <m:sSubPr>
+                        <m:ctrlPr>
+                          <a:rPr lang="en-US" i="1" smtClean="0">
+                            <a:latin typeface="Cambria Math" panose="02040503050406030204" pitchFamily="18" charset="0"/>
+                          </a:rPr>
+                        </m:ctrlPr>
+                      </m:sSubPr>
+                      <m:e>
+                        <m:r>
+                          <a:rPr lang="en-US" b="0" i="1" smtClean="0">
+                            <a:latin typeface="Cambria Math" panose="02040503050406030204" pitchFamily="18" charset="0"/>
+                          </a:rPr>
+                          <m:t>𝑏𝑤</m:t>
+                        </m:r>
+                      </m:e>
+                      <m:sub>
+                        <m:r>
+                          <a:rPr lang="en-US" b="0" i="1" smtClean="0">
+                            <a:latin typeface="Cambria Math" panose="02040503050406030204" pitchFamily="18" charset="0"/>
+                          </a:rPr>
+                          <m:t>𝑒𝑓𝑓𝑒𝑐𝑡𝑖𝑣𝑒</m:t>
+                        </m:r>
+                      </m:sub>
+                    </m:sSub>
+                  </m:oMath>
+                </a14:m>
+                <a:r>
+                  <a:rPr lang="en-US" dirty="0" smtClean="0"/>
+                  <a:t>: the perceived bandwidth available to the node during the TDMA period</a:t>
+                </a:r>
+              </a:p>
+              <a:p>
+                <a:pPr lvl="1"/>
+                <a14:m>
+                  <m:oMath xmlns:m="http://schemas.openxmlformats.org/officeDocument/2006/math">
+                    <m:sSub>
+                      <m:sSubPr>
+                        <m:ctrlPr>
+                          <a:rPr lang="en-US" i="1" smtClean="0">
+                            <a:latin typeface="Cambria Math" panose="02040503050406030204" pitchFamily="18" charset="0"/>
+                          </a:rPr>
+                        </m:ctrlPr>
+                      </m:sSubPr>
+                      <m:e>
+                        <m:r>
+                          <m:rPr>
+                            <m:sty m:val="p"/>
+                          </m:rPr>
+                          <a:rPr lang="en-US" b="0" i="0" smtClean="0">
+                            <a:latin typeface="Cambria Math" panose="02040503050406030204" pitchFamily="18" charset="0"/>
+                          </a:rPr>
+                          <m:t>Δ</m:t>
+                        </m:r>
+                      </m:e>
+                      <m:sub>
+                        <m:r>
+                          <a:rPr lang="en-US" b="0" i="1" smtClean="0">
+                            <a:latin typeface="Cambria Math" panose="02040503050406030204" pitchFamily="18" charset="0"/>
+                          </a:rPr>
+                          <m:t>𝑑𝑒𝑙𝑎𝑦</m:t>
+                        </m:r>
+                      </m:sub>
+                    </m:sSub>
+                  </m:oMath>
+                </a14:m>
+                <a:r>
+                  <a:rPr lang="en-US" dirty="0" smtClean="0"/>
+                  <a:t>: the change in the predicted delay experienced by application traffic</a:t>
+                </a:r>
+              </a:p>
+              <a:p>
+                <a:pPr lvl="1"/>
+                <a14:m>
+                  <m:oMath xmlns:m="http://schemas.openxmlformats.org/officeDocument/2006/math">
+                    <m:sSub>
+                      <m:sSubPr>
+                        <m:ctrlPr>
+                          <a:rPr lang="en-US" i="1" smtClean="0">
+                            <a:latin typeface="Cambria Math" panose="02040503050406030204" pitchFamily="18" charset="0"/>
+                          </a:rPr>
+                        </m:ctrlPr>
+                      </m:sSubPr>
+                      <m:e>
+                        <m:r>
+                          <m:rPr>
+                            <m:sty m:val="p"/>
+                          </m:rPr>
+                          <a:rPr lang="en-US" b="0" i="0" smtClean="0">
+                            <a:latin typeface="Cambria Math" panose="02040503050406030204" pitchFamily="18" charset="0"/>
+                          </a:rPr>
+                          <m:t>Δ</m:t>
+                        </m:r>
+                      </m:e>
+                      <m:sub>
+                        <m:r>
+                          <a:rPr lang="en-US" b="0" i="1" smtClean="0">
+                            <a:latin typeface="Cambria Math" panose="02040503050406030204" pitchFamily="18" charset="0"/>
+                          </a:rPr>
+                          <m:t>𝑏𝑢𝑓𝑓𝑒𝑟</m:t>
+                        </m:r>
+                      </m:sub>
+                    </m:sSub>
+                  </m:oMath>
+                </a14:m>
+                <a:r>
+                  <a:rPr lang="en-US" dirty="0" smtClean="0"/>
+                  <a:t>: the change in the predicted buffer space required for the application</a:t>
+                </a:r>
+              </a:p>
+              <a:p>
+                <a:endParaRPr lang="en-US" dirty="0" smtClean="0"/>
+              </a:p>
+              <a:p>
+                <a:pPr lvl="1"/>
+                <a:endParaRPr lang="en-US" b="1" dirty="0" smtClean="0"/>
+              </a:p>
+            </p:txBody>
+          </p:sp>
+        </mc:Choice>
+        <mc:Fallback>
+          <p:sp>
+            <p:nvSpPr>
+              <p:cNvPr id="3" name="Content Placeholder 2"/>
+              <p:cNvSpPr>
+                <a:spLocks noGrp="1" noRot="1" noChangeAspect="1" noMove="1" noResize="1" noEditPoints="1" noAdjustHandles="1" noChangeArrowheads="1" noChangeShapeType="1" noTextEdit="1"/>
+              </p:cNvSpPr>
+              <p:nvPr>
+                <p:ph idx="1"/>
+              </p:nvPr>
+            </p:nvSpPr>
+            <p:spPr>
+              <a:blipFill>
+                <a:blip r:embed="rId2"/>
+                <a:stretch>
+                  <a:fillRect t="-1541" r="-756"/>
+                </a:stretch>
+              </a:blipFill>
+            </p:spPr>
+            <p:txBody>
+              <a:bodyPr/>
+              <a:lstStyle/>
+              <a:p>
+                <a:r>
+                  <a:rPr lang="en-US">
+                    <a:noFill/>
+                  </a:rPr>
+                  <a:t> </a:t>
+                </a:r>
+              </a:p>
+            </p:txBody>
+          </p:sp>
+        </mc:Fallback>
+      </mc:AlternateContent>
       <p:sp>
         <p:nvSpPr>
           <p:cNvPr id="4" name="Slide Number Placeholder 3"/>
@@ -11608,110 +11832,9 @@
             </a:r>
             <a:r>
               <a:rPr lang="en-US" dirty="0" smtClean="0"/>
-              <a:t> Compositional Analysis</a:t>
+              <a:t> Analysis of TDMA</a:t>
             </a:r>
             <a:endParaRPr lang="en-US" dirty="0"/>
-          </a:p>
-        </p:txBody>
-      </p:sp>
-      <p:sp>
-        <p:nvSpPr>
-          <p:cNvPr id="3" name="Content Placeholder 2"/>
-          <p:cNvSpPr>
-            <a:spLocks noGrp="1"/>
-          </p:cNvSpPr>
-          <p:nvPr>
-            <p:ph idx="1"/>
-          </p:nvPr>
-        </p:nvSpPr>
-        <p:spPr/>
-        <p:txBody>
-          <a:bodyPr>
-            <a:normAutofit lnSpcReduction="10000"/>
-          </a:bodyPr>
-          <a:lstStyle/>
-          <a:p>
-            <a:r>
-              <a:rPr lang="en-US" dirty="0" smtClean="0"/>
-              <a:t>Validated the accuracy of PNP</a:t>
-            </a:r>
-            <a:r>
-              <a:rPr lang="en-US" baseline="30000" dirty="0" smtClean="0"/>
-              <a:t>2</a:t>
-            </a:r>
-            <a:r>
-              <a:rPr lang="en-US" dirty="0" smtClean="0"/>
-              <a:t> predictions using custom network traffic generation code and a network testbed</a:t>
-            </a:r>
-          </a:p>
-          <a:p>
-            <a:pPr lvl="1"/>
-            <a:r>
-              <a:rPr lang="en-US" dirty="0" smtClean="0"/>
-              <a:t>Used </a:t>
-            </a:r>
-            <a:r>
-              <a:rPr lang="en-US" dirty="0" err="1" smtClean="0"/>
-              <a:t>Dummynet</a:t>
-            </a:r>
-            <a:r>
-              <a:rPr lang="en-US" dirty="0" smtClean="0"/>
-              <a:t> to perform traffic shaping and link emulation</a:t>
-            </a:r>
-          </a:p>
-          <a:p>
-            <a:r>
-              <a:rPr lang="en-US" dirty="0" smtClean="0"/>
-              <a:t>Integrated Network Calculus model into PNP</a:t>
-            </a:r>
-            <a:r>
-              <a:rPr lang="en-US" baseline="30000" dirty="0" smtClean="0"/>
-              <a:t>2</a:t>
-            </a:r>
-            <a:r>
-              <a:rPr lang="en-US" dirty="0" smtClean="0"/>
-              <a:t> tool, allows analysis of PNP</a:t>
-            </a:r>
-            <a:r>
-              <a:rPr lang="en-US" baseline="30000" dirty="0" smtClean="0"/>
-              <a:t>2</a:t>
-            </a:r>
-            <a:r>
-              <a:rPr lang="en-US" dirty="0" smtClean="0"/>
-              <a:t> model using NC’s semantics</a:t>
-            </a:r>
-          </a:p>
-          <a:p>
-            <a:pPr lvl="1"/>
-            <a:r>
-              <a:rPr lang="en-US" dirty="0" smtClean="0"/>
-              <a:t>Enables direct, easy comparison between analysis techniques</a:t>
-            </a:r>
-          </a:p>
-          <a:p>
-            <a:r>
-              <a:rPr lang="en-US" dirty="0" smtClean="0"/>
-              <a:t>Network Calculus defines arrival curves and service curves as functions of time-window size, therefore it cannot precisely analyze systems where the applications’ data production is tightly coupled with the service capacity of the system</a:t>
-            </a:r>
-          </a:p>
-          <a:p>
-            <a:pPr lvl="1"/>
-            <a:r>
-              <a:rPr lang="en-US" dirty="0" smtClean="0"/>
-              <a:t>i.e. applications know a </a:t>
-            </a:r>
-            <a:r>
-              <a:rPr lang="en-US" dirty="0" err="1" smtClean="0"/>
-              <a:t>prioi</a:t>
-            </a:r>
-            <a:r>
-              <a:rPr lang="en-US" dirty="0" smtClean="0"/>
-              <a:t> when the system will have high network capacity and are designed to send their data at that time</a:t>
-            </a:r>
-          </a:p>
-          <a:p>
-            <a:pPr lvl="1"/>
-            <a:endParaRPr lang="en-US" b="1" dirty="0" smtClean="0"/>
           </a:p>
         </p:txBody>
       </p:sp>
@@ -11738,10 +11861,619 @@
           </a:p>
         </p:txBody>
       </p:sp>
+      <p:pic>
+        <p:nvPicPr>
+          <p:cNvPr id="5" name="Picture 4"/>
+          <p:cNvPicPr>
+            <a:picLocks noChangeAspect="1"/>
+          </p:cNvPicPr>
+          <p:nvPr/>
+        </p:nvPicPr>
+        <p:blipFill>
+          <a:blip r:embed="rId3">
+            <a:extLst>
+              <a:ext uri="{28A0092B-C50C-407E-A947-70E740481C1C}">
+                <a14:useLocalDpi xmlns:a14="http://schemas.microsoft.com/office/drawing/2010/main" val="0"/>
+              </a:ext>
+            </a:extLst>
+          </a:blip>
+          <a:stretch>
+            <a:fillRect/>
+          </a:stretch>
+        </p:blipFill>
+        <p:spPr>
+          <a:xfrm>
+            <a:off x="152400" y="4038600"/>
+            <a:ext cx="3810000" cy="2871576"/>
+          </a:xfrm>
+          <a:prstGeom prst="rect">
+            <a:avLst/>
+          </a:prstGeom>
+        </p:spPr>
+      </p:pic>
+      <p:pic>
+        <p:nvPicPr>
+          <p:cNvPr id="6" name="Picture 5"/>
+          <p:cNvPicPr>
+            <a:picLocks noChangeAspect="1"/>
+          </p:cNvPicPr>
+          <p:nvPr/>
+        </p:nvPicPr>
+        <p:blipFill>
+          <a:blip r:embed="rId4">
+            <a:extLst>
+              <a:ext uri="{28A0092B-C50C-407E-A947-70E740481C1C}">
+                <a14:useLocalDpi xmlns:a14="http://schemas.microsoft.com/office/drawing/2010/main" val="0"/>
+              </a:ext>
+            </a:extLst>
+          </a:blip>
+          <a:stretch>
+            <a:fillRect/>
+          </a:stretch>
+        </p:blipFill>
+        <p:spPr>
+          <a:xfrm>
+            <a:off x="4557774" y="4038600"/>
+            <a:ext cx="3813573" cy="2874269"/>
+          </a:xfrm>
+          <a:prstGeom prst="rect">
+            <a:avLst/>
+          </a:prstGeom>
+        </p:spPr>
+      </p:pic>
+      <mc:AlternateContent xmlns:mc="http://schemas.openxmlformats.org/markup-compatibility/2006">
+        <mc:Choice xmlns:a14="http://schemas.microsoft.com/office/drawing/2010/main" Requires="a14">
+          <p:sp>
+            <p:nvSpPr>
+              <p:cNvPr id="3" name="Content Placeholder 2"/>
+              <p:cNvSpPr>
+                <a:spLocks noGrp="1"/>
+              </p:cNvSpPr>
+              <p:nvPr>
+                <p:ph idx="1"/>
+              </p:nvPr>
+            </p:nvSpPr>
+            <p:spPr>
+              <a:xfrm>
+                <a:off x="946404" y="1828801"/>
+                <a:ext cx="6446520" cy="2362199"/>
+              </a:xfrm>
+            </p:spPr>
+            <p:txBody>
+              <a:bodyPr>
+                <a:normAutofit fontScale="70000" lnSpcReduction="20000"/>
+              </a:bodyPr>
+              <a:lstStyle/>
+              <a:p>
+                <a:pPr marL="0" indent="0">
+                  <a:buNone/>
+                </a:pPr>
+                <a14:m>
+                  <m:oMathPara xmlns:m="http://schemas.openxmlformats.org/officeDocument/2006/math">
+                    <m:oMathParaPr>
+                      <m:jc m:val="centerGroup"/>
+                    </m:oMathParaPr>
+                    <m:oMath xmlns:m="http://schemas.openxmlformats.org/officeDocument/2006/math">
+                      <m:sSub>
+                        <m:sSubPr>
+                          <m:ctrlPr>
+                            <a:rPr lang="en-US" i="1" smtClean="0">
+                              <a:latin typeface="Cambria Math" panose="02040503050406030204" pitchFamily="18" charset="0"/>
+                            </a:rPr>
+                          </m:ctrlPr>
+                        </m:sSubPr>
+                        <m:e>
+                          <m:r>
+                            <a:rPr lang="en-US" b="0" i="1" smtClean="0">
+                              <a:latin typeface="Cambria Math" panose="02040503050406030204" pitchFamily="18" charset="0"/>
+                            </a:rPr>
+                            <m:t>𝑏𝑤</m:t>
+                          </m:r>
+                        </m:e>
+                        <m:sub>
+                          <m:r>
+                            <a:rPr lang="en-US" b="0" i="1" smtClean="0">
+                              <a:latin typeface="Cambria Math" panose="02040503050406030204" pitchFamily="18" charset="0"/>
+                            </a:rPr>
+                            <m:t>𝑒𝑓𝑓𝑒𝑐𝑡𝑖𝑣𝑒</m:t>
+                          </m:r>
+                        </m:sub>
+                      </m:sSub>
+                      <m:r>
+                        <a:rPr lang="en-US" b="0" i="1" smtClean="0">
+                          <a:latin typeface="Cambria Math" panose="02040503050406030204" pitchFamily="18" charset="0"/>
+                        </a:rPr>
+                        <m:t>=</m:t>
+                      </m:r>
+                      <m:sSub>
+                        <m:sSubPr>
+                          <m:ctrlPr>
+                            <a:rPr lang="en-US" b="0" i="1" smtClean="0">
+                              <a:latin typeface="Cambria Math" panose="02040503050406030204" pitchFamily="18" charset="0"/>
+                            </a:rPr>
+                          </m:ctrlPr>
+                        </m:sSubPr>
+                        <m:e>
+                          <m:r>
+                            <a:rPr lang="en-US" b="0" i="1" smtClean="0">
+                              <a:latin typeface="Cambria Math" panose="02040503050406030204" pitchFamily="18" charset="0"/>
+                            </a:rPr>
+                            <m:t>𝑏𝑤</m:t>
+                          </m:r>
+                        </m:e>
+                        <m:sub>
+                          <m:r>
+                            <a:rPr lang="en-US" b="0" i="1" smtClean="0">
+                              <a:latin typeface="Cambria Math" panose="02040503050406030204" pitchFamily="18" charset="0"/>
+                            </a:rPr>
+                            <m:t>𝑛</m:t>
+                          </m:r>
+                        </m:sub>
+                      </m:sSub>
+                      <m:r>
+                        <a:rPr lang="en-US" b="0" i="1" smtClean="0">
+                          <a:latin typeface="Cambria Math" panose="02040503050406030204" pitchFamily="18" charset="0"/>
+                        </a:rPr>
+                        <m:t>∗</m:t>
+                      </m:r>
+                      <m:f>
+                        <m:fPr>
+                          <m:ctrlPr>
+                            <a:rPr lang="en-US" b="0" i="1" smtClean="0">
+                              <a:latin typeface="Cambria Math" panose="02040503050406030204" pitchFamily="18" charset="0"/>
+                            </a:rPr>
+                          </m:ctrlPr>
+                        </m:fPr>
+                        <m:num>
+                          <m:sSub>
+                            <m:sSubPr>
+                              <m:ctrlPr>
+                                <a:rPr lang="en-US" b="0" i="1" smtClean="0">
+                                  <a:latin typeface="Cambria Math" panose="02040503050406030204" pitchFamily="18" charset="0"/>
+                                </a:rPr>
+                              </m:ctrlPr>
+                            </m:sSubPr>
+                            <m:e>
+                              <m:r>
+                                <a:rPr lang="en-US" b="0" i="1" smtClean="0">
+                                  <a:latin typeface="Cambria Math" panose="02040503050406030204" pitchFamily="18" charset="0"/>
+                                </a:rPr>
+                                <m:t>𝑡</m:t>
+                              </m:r>
+                            </m:e>
+                            <m:sub>
+                              <m:r>
+                                <a:rPr lang="en-US" b="0" i="1" smtClean="0">
+                                  <a:latin typeface="Cambria Math" panose="02040503050406030204" pitchFamily="18" charset="0"/>
+                                </a:rPr>
+                                <m:t>𝑛</m:t>
+                              </m:r>
+                            </m:sub>
+                          </m:sSub>
+                        </m:num>
+                        <m:den>
+                          <m:r>
+                            <a:rPr lang="en-US" b="0" i="1" smtClean="0">
+                              <a:latin typeface="Cambria Math" panose="02040503050406030204" pitchFamily="18" charset="0"/>
+                            </a:rPr>
+                            <m:t>𝑇</m:t>
+                          </m:r>
+                        </m:den>
+                      </m:f>
+                    </m:oMath>
+                    <m:oMath xmlns:m="http://schemas.openxmlformats.org/officeDocument/2006/math">
+                      <m:sSub>
+                        <m:sSubPr>
+                          <m:ctrlPr>
+                            <a:rPr lang="en-US" b="0" i="1" smtClean="0">
+                              <a:latin typeface="Cambria Math" panose="02040503050406030204" pitchFamily="18" charset="0"/>
+                            </a:rPr>
+                          </m:ctrlPr>
+                        </m:sSubPr>
+                        <m:e>
+                          <m:r>
+                            <m:rPr>
+                              <m:sty m:val="p"/>
+                            </m:rPr>
+                            <a:rPr lang="en-US" b="0" i="0" smtClean="0">
+                              <a:latin typeface="Cambria Math" panose="02040503050406030204" pitchFamily="18" charset="0"/>
+                            </a:rPr>
+                            <m:t>Δ</m:t>
+                          </m:r>
+                        </m:e>
+                        <m:sub>
+                          <m:r>
+                            <a:rPr lang="en-US" b="0" i="1" smtClean="0">
+                              <a:latin typeface="Cambria Math" panose="02040503050406030204" pitchFamily="18" charset="0"/>
+                            </a:rPr>
+                            <m:t>𝑑𝑒𝑙𝑎𝑦</m:t>
+                          </m:r>
+                        </m:sub>
+                      </m:sSub>
+                      <m:r>
+                        <a:rPr lang="en-US" b="0" i="1" smtClean="0">
+                          <a:latin typeface="Cambria Math" panose="02040503050406030204" pitchFamily="18" charset="0"/>
+                        </a:rPr>
+                        <m:t>=</m:t>
+                      </m:r>
+                      <m:r>
+                        <a:rPr lang="en-US" b="0" i="1" smtClean="0">
+                          <a:latin typeface="Cambria Math" panose="02040503050406030204" pitchFamily="18" charset="0"/>
+                        </a:rPr>
+                        <m:t>𝑇</m:t>
+                      </m:r>
+                      <m:r>
+                        <a:rPr lang="en-US" b="0" i="1" smtClean="0">
+                          <a:latin typeface="Cambria Math" panose="02040503050406030204" pitchFamily="18" charset="0"/>
+                        </a:rPr>
+                        <m:t>−</m:t>
+                      </m:r>
+                      <m:sSub>
+                        <m:sSubPr>
+                          <m:ctrlPr>
+                            <a:rPr lang="en-US" b="0" i="1" smtClean="0">
+                              <a:latin typeface="Cambria Math" panose="02040503050406030204" pitchFamily="18" charset="0"/>
+                            </a:rPr>
+                          </m:ctrlPr>
+                        </m:sSubPr>
+                        <m:e>
+                          <m:r>
+                            <a:rPr lang="en-US" b="0" i="1" smtClean="0">
+                              <a:latin typeface="Cambria Math" panose="02040503050406030204" pitchFamily="18" charset="0"/>
+                            </a:rPr>
+                            <m:t>𝑡</m:t>
+                          </m:r>
+                        </m:e>
+                        <m:sub>
+                          <m:r>
+                            <a:rPr lang="en-US" b="0" i="1" smtClean="0">
+                              <a:latin typeface="Cambria Math" panose="02040503050406030204" pitchFamily="18" charset="0"/>
+                            </a:rPr>
+                            <m:t>𝑛</m:t>
+                          </m:r>
+                        </m:sub>
+                      </m:sSub>
+                    </m:oMath>
+                    <m:oMath xmlns:m="http://schemas.openxmlformats.org/officeDocument/2006/math">
+                      <m:sSub>
+                        <m:sSubPr>
+                          <m:ctrlPr>
+                            <a:rPr lang="en-US" b="0" i="1" smtClean="0">
+                              <a:latin typeface="Cambria Math" panose="02040503050406030204" pitchFamily="18" charset="0"/>
+                            </a:rPr>
+                          </m:ctrlPr>
+                        </m:sSubPr>
+                        <m:e>
+                          <m:r>
+                            <m:rPr>
+                              <m:sty m:val="p"/>
+                            </m:rPr>
+                            <a:rPr lang="en-US" b="0" i="0" smtClean="0">
+                              <a:latin typeface="Cambria Math" panose="02040503050406030204" pitchFamily="18" charset="0"/>
+                            </a:rPr>
+                            <m:t>Δ</m:t>
+                          </m:r>
+                        </m:e>
+                        <m:sub>
+                          <m:r>
+                            <a:rPr lang="en-US" b="0" i="1" smtClean="0">
+                              <a:latin typeface="Cambria Math" panose="02040503050406030204" pitchFamily="18" charset="0"/>
+                            </a:rPr>
+                            <m:t>𝑏𝑢𝑓𝑓𝑒𝑟</m:t>
+                          </m:r>
+                        </m:sub>
+                      </m:sSub>
+                      <m:r>
+                        <a:rPr lang="en-US" b="0" i="1" smtClean="0">
+                          <a:latin typeface="Cambria Math" panose="02040503050406030204" pitchFamily="18" charset="0"/>
+                        </a:rPr>
+                        <m:t>=</m:t>
+                      </m:r>
+                      <m:sSub>
+                        <m:sSubPr>
+                          <m:ctrlPr>
+                            <a:rPr lang="en-US" b="0" i="1" smtClean="0">
+                              <a:latin typeface="Cambria Math" panose="02040503050406030204" pitchFamily="18" charset="0"/>
+                            </a:rPr>
+                          </m:ctrlPr>
+                        </m:sSubPr>
+                        <m:e>
+                          <m:r>
+                            <m:rPr>
+                              <m:sty m:val="p"/>
+                            </m:rPr>
+                            <a:rPr lang="en-US" b="0" i="0" smtClean="0">
+                              <a:latin typeface="Cambria Math" panose="02040503050406030204" pitchFamily="18" charset="0"/>
+                            </a:rPr>
+                            <m:t>Δ</m:t>
+                          </m:r>
+                        </m:e>
+                        <m:sub>
+                          <m:r>
+                            <a:rPr lang="en-US" b="0" i="1" smtClean="0">
+                              <a:latin typeface="Cambria Math" panose="02040503050406030204" pitchFamily="18" charset="0"/>
+                            </a:rPr>
+                            <m:t>𝑑𝑒𝑙𝑎𝑦</m:t>
+                          </m:r>
+                        </m:sub>
+                      </m:sSub>
+                      <m:r>
+                        <a:rPr lang="en-US" b="0" i="1" smtClean="0">
+                          <a:latin typeface="Cambria Math" panose="02040503050406030204" pitchFamily="18" charset="0"/>
+                        </a:rPr>
+                        <m:t>∗</m:t>
+                      </m:r>
+                      <m:sSub>
+                        <m:sSubPr>
+                          <m:ctrlPr>
+                            <a:rPr lang="en-US" b="0" i="1" smtClean="0">
+                              <a:latin typeface="Cambria Math" panose="02040503050406030204" pitchFamily="18" charset="0"/>
+                            </a:rPr>
+                          </m:ctrlPr>
+                        </m:sSubPr>
+                        <m:e>
+                          <m:r>
+                            <a:rPr lang="en-US" b="0" i="1" smtClean="0">
+                              <a:latin typeface="Cambria Math" panose="02040503050406030204" pitchFamily="18" charset="0"/>
+                            </a:rPr>
+                            <m:t>𝑏𝑤</m:t>
+                          </m:r>
+                        </m:e>
+                        <m:sub>
+                          <m:r>
+                            <a:rPr lang="en-US" b="0" i="1" smtClean="0">
+                              <a:latin typeface="Cambria Math" panose="02040503050406030204" pitchFamily="18" charset="0"/>
+                            </a:rPr>
+                            <m:t>𝑒𝑓𝑓𝑒𝑐𝑡𝑖𝑣𝑒</m:t>
+                          </m:r>
+                        </m:sub>
+                      </m:sSub>
+                    </m:oMath>
+                  </m:oMathPara>
+                </a14:m>
+                <a:endParaRPr lang="en-US" dirty="0" smtClean="0"/>
+              </a:p>
+              <a:p>
+                <a:r>
+                  <a:rPr lang="en-US" dirty="0" smtClean="0"/>
+                  <a:t>Since</a:t>
+                </a:r>
+              </a:p>
+              <a:p>
+                <a:pPr lvl="1"/>
+                <a14:m>
+                  <m:oMath xmlns:m="http://schemas.openxmlformats.org/officeDocument/2006/math">
+                    <m:sSub>
+                      <m:sSubPr>
+                        <m:ctrlPr>
+                          <a:rPr lang="en-US" i="1" smtClean="0">
+                            <a:latin typeface="Cambria Math" panose="02040503050406030204" pitchFamily="18" charset="0"/>
+                          </a:rPr>
+                        </m:ctrlPr>
+                      </m:sSubPr>
+                      <m:e>
+                        <m:r>
+                          <a:rPr lang="en-US" b="0" i="1" smtClean="0">
+                            <a:latin typeface="Cambria Math" panose="02040503050406030204" pitchFamily="18" charset="0"/>
+                          </a:rPr>
+                          <m:t>𝑡</m:t>
+                        </m:r>
+                      </m:e>
+                      <m:sub>
+                        <m:r>
+                          <a:rPr lang="en-US" b="0" i="1" smtClean="0">
+                            <a:latin typeface="Cambria Math" panose="02040503050406030204" pitchFamily="18" charset="0"/>
+                          </a:rPr>
+                          <m:t>𝑛</m:t>
+                        </m:r>
+                      </m:sub>
+                    </m:sSub>
+                  </m:oMath>
+                </a14:m>
+                <a:r>
+                  <a:rPr lang="en-US" dirty="0" smtClean="0"/>
+                  <a:t> is dependent on </a:t>
+                </a:r>
+                <a14:m>
+                  <m:oMath xmlns:m="http://schemas.openxmlformats.org/officeDocument/2006/math">
+                    <m:r>
+                      <a:rPr lang="en-US" b="0" i="1" smtClean="0">
+                        <a:latin typeface="Cambria Math" panose="02040503050406030204" pitchFamily="18" charset="0"/>
+                      </a:rPr>
+                      <m:t>𝑇</m:t>
+                    </m:r>
+                  </m:oMath>
+                </a14:m>
+                <a:endParaRPr lang="en-US" dirty="0" smtClean="0"/>
+              </a:p>
+              <a:p>
+                <a:pPr lvl="1"/>
+                <a14:m>
+                  <m:oMath xmlns:m="http://schemas.openxmlformats.org/officeDocument/2006/math">
+                    <m:sSub>
+                      <m:sSubPr>
+                        <m:ctrlPr>
+                          <a:rPr lang="en-US" i="1" smtClean="0">
+                            <a:latin typeface="Cambria Math" panose="02040503050406030204" pitchFamily="18" charset="0"/>
+                          </a:rPr>
+                        </m:ctrlPr>
+                      </m:sSubPr>
+                      <m:e>
+                        <m:r>
+                          <m:rPr>
+                            <m:sty m:val="p"/>
+                          </m:rPr>
+                          <a:rPr lang="en-US" b="0" i="0" smtClean="0">
+                            <a:latin typeface="Cambria Math" panose="02040503050406030204" pitchFamily="18" charset="0"/>
+                          </a:rPr>
+                          <m:t>Δ</m:t>
+                        </m:r>
+                      </m:e>
+                      <m:sub>
+                        <m:r>
+                          <a:rPr lang="en-US" b="0" i="1" smtClean="0">
+                            <a:latin typeface="Cambria Math" panose="02040503050406030204" pitchFamily="18" charset="0"/>
+                          </a:rPr>
+                          <m:t>𝑑𝑒𝑙𝑎𝑦</m:t>
+                        </m:r>
+                      </m:sub>
+                    </m:sSub>
+                  </m:oMath>
+                </a14:m>
+                <a:r>
+                  <a:rPr lang="en-US" dirty="0" smtClean="0"/>
+                  <a:t> is bounded by </a:t>
+                </a:r>
+                <a14:m>
+                  <m:oMath xmlns:m="http://schemas.openxmlformats.org/officeDocument/2006/math">
+                    <m:r>
+                      <a:rPr lang="en-US" b="0" i="1" smtClean="0">
+                        <a:latin typeface="Cambria Math" panose="02040503050406030204" pitchFamily="18" charset="0"/>
+                      </a:rPr>
+                      <m:t>𝑇</m:t>
+                    </m:r>
+                  </m:oMath>
+                </a14:m>
+                <a:endParaRPr lang="en-US" dirty="0" smtClean="0"/>
+              </a:p>
+              <a:p>
+                <a:pPr lvl="1"/>
+                <a14:m>
+                  <m:oMath xmlns:m="http://schemas.openxmlformats.org/officeDocument/2006/math">
+                    <m:sSub>
+                      <m:sSubPr>
+                        <m:ctrlPr>
+                          <a:rPr lang="en-US" i="1" smtClean="0">
+                            <a:latin typeface="Cambria Math" panose="02040503050406030204" pitchFamily="18" charset="0"/>
+                          </a:rPr>
+                        </m:ctrlPr>
+                      </m:sSubPr>
+                      <m:e>
+                        <m:r>
+                          <m:rPr>
+                            <m:sty m:val="p"/>
+                          </m:rPr>
+                          <a:rPr lang="en-US" b="0" i="0" smtClean="0">
+                            <a:latin typeface="Cambria Math" panose="02040503050406030204" pitchFamily="18" charset="0"/>
+                          </a:rPr>
+                          <m:t>Δ</m:t>
+                        </m:r>
+                      </m:e>
+                      <m:sub>
+                        <m:r>
+                          <a:rPr lang="en-US" b="0" i="1" smtClean="0">
+                            <a:latin typeface="Cambria Math" panose="02040503050406030204" pitchFamily="18" charset="0"/>
+                          </a:rPr>
+                          <m:t>𝑏𝑢𝑓𝑓𝑒𝑟</m:t>
+                        </m:r>
+                      </m:sub>
+                    </m:sSub>
+                  </m:oMath>
+                </a14:m>
+                <a:r>
+                  <a:rPr lang="en-US" dirty="0" smtClean="0"/>
+                  <a:t> is governed by </a:t>
+                </a:r>
+                <a14:m>
+                  <m:oMath xmlns:m="http://schemas.openxmlformats.org/officeDocument/2006/math">
+                    <m:sSub>
+                      <m:sSubPr>
+                        <m:ctrlPr>
+                          <a:rPr lang="en-US" i="1" smtClean="0">
+                            <a:latin typeface="Cambria Math" panose="02040503050406030204" pitchFamily="18" charset="0"/>
+                          </a:rPr>
+                        </m:ctrlPr>
+                      </m:sSubPr>
+                      <m:e>
+                        <m:r>
+                          <a:rPr lang="en-US" b="0" i="1" smtClean="0">
+                            <a:latin typeface="Cambria Math" panose="02040503050406030204" pitchFamily="18" charset="0"/>
+                          </a:rPr>
+                          <m:t>𝑡</m:t>
+                        </m:r>
+                      </m:e>
+                      <m:sub>
+                        <m:r>
+                          <a:rPr lang="en-US" b="0" i="1" smtClean="0">
+                            <a:latin typeface="Cambria Math" panose="02040503050406030204" pitchFamily="18" charset="0"/>
+                          </a:rPr>
+                          <m:t>𝑛</m:t>
+                        </m:r>
+                      </m:sub>
+                    </m:sSub>
+                  </m:oMath>
+                </a14:m>
+                <a:endParaRPr lang="en-US" dirty="0" smtClean="0"/>
+              </a:p>
+              <a:p>
+                <a:r>
+                  <a:rPr lang="en-US" dirty="0" smtClean="0"/>
+                  <a:t>Minimizing </a:t>
+                </a:r>
+                <a14:m>
+                  <m:oMath xmlns:m="http://schemas.openxmlformats.org/officeDocument/2006/math">
+                    <m:r>
+                      <a:rPr lang="en-US" b="0" i="1" smtClean="0">
+                        <a:latin typeface="Cambria Math" panose="02040503050406030204" pitchFamily="18" charset="0"/>
+                      </a:rPr>
+                      <m:t>𝑇</m:t>
+                    </m:r>
+                  </m:oMath>
+                </a14:m>
+                <a:r>
+                  <a:rPr lang="en-US" dirty="0" smtClean="0"/>
+                  <a:t> minimizes both the maximum extra delay and maximum extra buffer space</a:t>
+                </a:r>
+              </a:p>
+              <a:p>
+                <a:pPr lvl="1"/>
+                <a:endParaRPr lang="en-US" dirty="0" smtClean="0"/>
+              </a:p>
+            </p:txBody>
+          </p:sp>
+        </mc:Choice>
+        <mc:Fallback>
+          <p:sp>
+            <p:nvSpPr>
+              <p:cNvPr id="3" name="Content Placeholder 2"/>
+              <p:cNvSpPr>
+                <a:spLocks noGrp="1" noRot="1" noChangeAspect="1" noMove="1" noResize="1" noEditPoints="1" noAdjustHandles="1" noChangeArrowheads="1" noChangeShapeType="1" noTextEdit="1"/>
+              </p:cNvSpPr>
+              <p:nvPr>
+                <p:ph idx="1"/>
+              </p:nvPr>
+            </p:nvSpPr>
+            <p:spPr>
+              <a:xfrm>
+                <a:off x="946404" y="1828801"/>
+                <a:ext cx="6446520" cy="2362199"/>
+              </a:xfrm>
+              <a:blipFill>
+                <a:blip r:embed="rId5"/>
+                <a:stretch>
+                  <a:fillRect/>
+                </a:stretch>
+              </a:blipFill>
+            </p:spPr>
+            <p:txBody>
+              <a:bodyPr/>
+              <a:lstStyle/>
+              <a:p>
+                <a:r>
+                  <a:rPr lang="en-US">
+                    <a:noFill/>
+                  </a:rPr>
+                  <a:t> </a:t>
+                </a:r>
+              </a:p>
+            </p:txBody>
+          </p:sp>
+        </mc:Fallback>
+      </mc:AlternateContent>
     </p:spTree>
     <p:extLst>
       <p:ext uri="{BB962C8B-B14F-4D97-AF65-F5344CB8AC3E}">
-        <p14:creationId xmlns:p14="http://schemas.microsoft.com/office/powerpoint/2010/main" val="3665410854"/>
+        <p14:creationId xmlns:p14="http://schemas.microsoft.com/office/powerpoint/2010/main" val="298565998"/>
       </p:ext>
     </p:extLst>
   </p:cSld>
@@ -11802,7 +12534,7 @@
             </a:r>
             <a:r>
               <a:rPr lang="en-US" dirty="0" smtClean="0"/>
-              <a:t> Delay Analysis</a:t>
+              <a:t> Compositional Analysis</a:t>
             </a:r>
             <a:endParaRPr lang="en-US" dirty="0"/>
           </a:p>
@@ -11935,7 +12667,7 @@
     </p:spTree>
     <p:extLst>
       <p:ext uri="{BB962C8B-B14F-4D97-AF65-F5344CB8AC3E}">
-        <p14:creationId xmlns:p14="http://schemas.microsoft.com/office/powerpoint/2010/main" val="581634497"/>
+        <p14:creationId xmlns:p14="http://schemas.microsoft.com/office/powerpoint/2010/main" val="3665410854"/>
       </p:ext>
     </p:extLst>
   </p:cSld>
@@ -11996,7 +12728,7 @@
             </a:r>
             <a:r>
               <a:rPr lang="en-US" dirty="0" smtClean="0"/>
-              <a:t> Analysis of Statically Routed Networks</a:t>
+              <a:t> Delay Analysis</a:t>
             </a:r>
             <a:endParaRPr lang="en-US" dirty="0"/>
           </a:p>
@@ -12121,6 +12853,200 @@
             <a:fld id="{4FAB73BC-B049-4115-A692-8D63A059BFB8}" type="slidenum">
               <a:rPr lang="en-US" smtClean="0"/>
               <a:t>22</a:t>
+            </a:fld>
+            <a:endParaRPr lang="en-US" dirty="0"/>
+          </a:p>
+        </p:txBody>
+      </p:sp>
+    </p:spTree>
+    <p:extLst>
+      <p:ext uri="{BB962C8B-B14F-4D97-AF65-F5344CB8AC3E}">
+        <p14:creationId xmlns:p14="http://schemas.microsoft.com/office/powerpoint/2010/main" val="581634497"/>
+      </p:ext>
+    </p:extLst>
+  </p:cSld>
+  <p:clrMapOvr>
+    <a:masterClrMapping/>
+  </p:clrMapOvr>
+  <p:timing>
+    <p:tnLst>
+      <p:par>
+        <p:cTn id="1" dur="indefinite" restart="never" nodeType="tmRoot"/>
+      </p:par>
+    </p:tnLst>
+  </p:timing>
+</p:sld>
+</file>
+
+<file path=ppt/slides/slide23.xml><?xml version="1.0" encoding="utf-8"?>
+<p:sld xmlns:a="http://schemas.openxmlformats.org/drawingml/2006/main" xmlns:r="http://schemas.openxmlformats.org/officeDocument/2006/relationships" xmlns:p="http://schemas.openxmlformats.org/presentationml/2006/main">
+  <p:cSld>
+    <p:spTree>
+      <p:nvGrpSpPr>
+        <p:cNvPr id="1" name=""/>
+        <p:cNvGrpSpPr/>
+        <p:nvPr/>
+      </p:nvGrpSpPr>
+      <p:grpSpPr>
+        <a:xfrm>
+          <a:off x="0" y="0"/>
+          <a:ext cx="0" cy="0"/>
+          <a:chOff x="0" y="0"/>
+          <a:chExt cx="0" cy="0"/>
+        </a:xfrm>
+      </p:grpSpPr>
+      <p:sp>
+        <p:nvSpPr>
+          <p:cNvPr id="2" name="Title 1"/>
+          <p:cNvSpPr>
+            <a:spLocks noGrp="1"/>
+          </p:cNvSpPr>
+          <p:nvPr>
+            <p:ph type="title"/>
+          </p:nvPr>
+        </p:nvSpPr>
+        <p:spPr/>
+        <p:txBody>
+          <a:bodyPr>
+            <a:normAutofit/>
+          </a:bodyPr>
+          <a:lstStyle/>
+          <a:p>
+            <a:r>
+              <a:rPr lang="en-US" dirty="0" smtClean="0"/>
+              <a:t>PNP</a:t>
+            </a:r>
+            <a:r>
+              <a:rPr lang="en-US" baseline="30000" dirty="0" smtClean="0"/>
+              <a:t>2</a:t>
+            </a:r>
+            <a:r>
+              <a:rPr lang="en-US" dirty="0" smtClean="0"/>
+              <a:t> Analysis of Statically Routed Networks</a:t>
+            </a:r>
+            <a:endParaRPr lang="en-US" dirty="0"/>
+          </a:p>
+        </p:txBody>
+      </p:sp>
+      <p:sp>
+        <p:nvSpPr>
+          <p:cNvPr id="3" name="Content Placeholder 2"/>
+          <p:cNvSpPr>
+            <a:spLocks noGrp="1"/>
+          </p:cNvSpPr>
+          <p:nvPr>
+            <p:ph idx="1"/>
+          </p:nvPr>
+        </p:nvSpPr>
+        <p:spPr/>
+        <p:txBody>
+          <a:bodyPr>
+            <a:normAutofit lnSpcReduction="10000"/>
+          </a:bodyPr>
+          <a:lstStyle/>
+          <a:p>
+            <a:r>
+              <a:rPr lang="en-US" dirty="0" smtClean="0"/>
+              <a:t>Validated the accuracy of PNP</a:t>
+            </a:r>
+            <a:r>
+              <a:rPr lang="en-US" baseline="30000" dirty="0" smtClean="0"/>
+              <a:t>2</a:t>
+            </a:r>
+            <a:r>
+              <a:rPr lang="en-US" dirty="0" smtClean="0"/>
+              <a:t> predictions using custom network traffic generation code and a network testbed</a:t>
+            </a:r>
+          </a:p>
+          <a:p>
+            <a:pPr lvl="1"/>
+            <a:r>
+              <a:rPr lang="en-US" dirty="0" smtClean="0"/>
+              <a:t>Used </a:t>
+            </a:r>
+            <a:r>
+              <a:rPr lang="en-US" dirty="0" err="1" smtClean="0"/>
+              <a:t>Dummynet</a:t>
+            </a:r>
+            <a:r>
+              <a:rPr lang="en-US" dirty="0" smtClean="0"/>
+              <a:t> to perform traffic shaping and link emulation</a:t>
+            </a:r>
+          </a:p>
+          <a:p>
+            <a:r>
+              <a:rPr lang="en-US" dirty="0" smtClean="0"/>
+              <a:t>Integrated Network Calculus model into PNP</a:t>
+            </a:r>
+            <a:r>
+              <a:rPr lang="en-US" baseline="30000" dirty="0" smtClean="0"/>
+              <a:t>2</a:t>
+            </a:r>
+            <a:r>
+              <a:rPr lang="en-US" dirty="0" smtClean="0"/>
+              <a:t> tool, allows analysis of PNP</a:t>
+            </a:r>
+            <a:r>
+              <a:rPr lang="en-US" baseline="30000" dirty="0" smtClean="0"/>
+              <a:t>2</a:t>
+            </a:r>
+            <a:r>
+              <a:rPr lang="en-US" dirty="0" smtClean="0"/>
+              <a:t> model using NC’s semantics</a:t>
+            </a:r>
+          </a:p>
+          <a:p>
+            <a:pPr lvl="1"/>
+            <a:r>
+              <a:rPr lang="en-US" dirty="0" smtClean="0"/>
+              <a:t>Enables direct, easy comparison between analysis techniques</a:t>
+            </a:r>
+          </a:p>
+          <a:p>
+            <a:r>
+              <a:rPr lang="en-US" dirty="0" smtClean="0"/>
+              <a:t>Network Calculus defines arrival curves and service curves as functions of time-window size, therefore it cannot precisely analyze systems where the applications’ data production is tightly coupled with the service capacity of the system</a:t>
+            </a:r>
+          </a:p>
+          <a:p>
+            <a:pPr lvl="1"/>
+            <a:r>
+              <a:rPr lang="en-US" dirty="0" smtClean="0"/>
+              <a:t>i.e. applications know a </a:t>
+            </a:r>
+            <a:r>
+              <a:rPr lang="en-US" dirty="0" err="1" smtClean="0"/>
+              <a:t>prioi</a:t>
+            </a:r>
+            <a:r>
+              <a:rPr lang="en-US" dirty="0" smtClean="0"/>
+              <a:t> when the system will have high network capacity and are designed to send their data at that time</a:t>
+            </a:r>
+          </a:p>
+          <a:p>
+            <a:pPr lvl="1"/>
+            <a:endParaRPr lang="en-US" b="1" dirty="0" smtClean="0"/>
+          </a:p>
+        </p:txBody>
+      </p:sp>
+      <p:sp>
+        <p:nvSpPr>
+          <p:cNvPr id="4" name="Slide Number Placeholder 3"/>
+          <p:cNvSpPr>
+            <a:spLocks noGrp="1"/>
+          </p:cNvSpPr>
+          <p:nvPr>
+            <p:ph type="sldNum" sz="quarter" idx="12"/>
+          </p:nvPr>
+        </p:nvSpPr>
+        <p:spPr/>
+        <p:txBody>
+          <a:bodyPr/>
+          <a:lstStyle/>
+          <a:p>
+            <a:fld id="{4FAB73BC-B049-4115-A692-8D63A059BFB8}" type="slidenum">
+              <a:rPr lang="en-US" smtClean="0"/>
+              <a:t>23</a:t>
             </a:fld>
             <a:endParaRPr lang="en-US" dirty="0"/>
           </a:p>
@@ -12146,7 +13072,7 @@
 </p:sld>
 </file>
 
-<file path=ppt/slides/slide23.xml><?xml version="1.0" encoding="utf-8"?>
+<file path=ppt/slides/slide24.xml><?xml version="1.0" encoding="utf-8"?>
 <p:sld xmlns:a="http://schemas.openxmlformats.org/drawingml/2006/main" xmlns:r="http://schemas.openxmlformats.org/officeDocument/2006/relationships" xmlns:p="http://schemas.openxmlformats.org/presentationml/2006/main">
   <p:cSld>
     <p:spTree>
@@ -12447,7 +13373,7 @@
           <a:p>
             <a:fld id="{4FAB73BC-B049-4115-A692-8D63A059BFB8}" type="slidenum">
               <a:rPr lang="en-US" smtClean="0"/>
-              <a:t>23</a:t>
+              <a:t>24</a:t>
             </a:fld>
             <a:endParaRPr lang="en-US" dirty="0"/>
           </a:p>
@@ -12457,166 +13383,6 @@
     <p:extLst>
       <p:ext uri="{BB962C8B-B14F-4D97-AF65-F5344CB8AC3E}">
         <p14:creationId xmlns:p14="http://schemas.microsoft.com/office/powerpoint/2010/main" val="2712061143"/>
-      </p:ext>
-    </p:extLst>
-  </p:cSld>
-  <p:clrMapOvr>
-    <a:masterClrMapping/>
-  </p:clrMapOvr>
-  <p:timing>
-    <p:tnLst>
-      <p:par>
-        <p:cTn id="1" dur="indefinite" restart="never" nodeType="tmRoot"/>
-      </p:par>
-    </p:tnLst>
-  </p:timing>
-</p:sld>
-</file>
-
-<file path=ppt/slides/slide24.xml><?xml version="1.0" encoding="utf-8"?>
-<p:sld xmlns:a="http://schemas.openxmlformats.org/drawingml/2006/main" xmlns:r="http://schemas.openxmlformats.org/officeDocument/2006/relationships" xmlns:p="http://schemas.openxmlformats.org/presentationml/2006/main">
-  <p:cSld>
-    <p:spTree>
-      <p:nvGrpSpPr>
-        <p:cNvPr id="1" name=""/>
-        <p:cNvGrpSpPr/>
-        <p:nvPr/>
-      </p:nvGrpSpPr>
-      <p:grpSpPr>
-        <a:xfrm>
-          <a:off x="0" y="0"/>
-          <a:ext cx="0" cy="0"/>
-          <a:chOff x="0" y="0"/>
-          <a:chExt cx="0" cy="0"/>
-        </a:xfrm>
-      </p:grpSpPr>
-      <p:sp>
-        <p:nvSpPr>
-          <p:cNvPr id="2" name="Title 1"/>
-          <p:cNvSpPr>
-            <a:spLocks noGrp="1"/>
-          </p:cNvSpPr>
-          <p:nvPr>
-            <p:ph type="title"/>
-          </p:nvPr>
-        </p:nvSpPr>
-        <p:spPr/>
-        <p:txBody>
-          <a:bodyPr>
-            <a:normAutofit/>
-          </a:bodyPr>
-          <a:lstStyle/>
-          <a:p>
-            <a:r>
-              <a:rPr lang="en-US" dirty="0" smtClean="0"/>
-              <a:t>Comparison of </a:t>
-            </a:r>
-            <a:r>
-              <a:rPr lang="en-US" dirty="0"/>
-              <a:t>PNP</a:t>
-            </a:r>
-            <a:r>
-              <a:rPr lang="en-US" baseline="30000" dirty="0"/>
-              <a:t>2</a:t>
-            </a:r>
-            <a:r>
-              <a:rPr lang="en-US" dirty="0" smtClean="0"/>
-              <a:t> </a:t>
-            </a:r>
-            <a:r>
-              <a:rPr lang="en-US" dirty="0" smtClean="0"/>
-              <a:t>with RTC Toolbox</a:t>
-            </a:r>
-            <a:endParaRPr lang="en-US" dirty="0"/>
-          </a:p>
-        </p:txBody>
-      </p:sp>
-      <p:sp>
-        <p:nvSpPr>
-          <p:cNvPr id="3" name="Content Placeholder 2"/>
-          <p:cNvSpPr>
-            <a:spLocks noGrp="1"/>
-          </p:cNvSpPr>
-          <p:nvPr>
-            <p:ph idx="1"/>
-          </p:nvPr>
-        </p:nvSpPr>
-        <p:spPr/>
-        <p:txBody>
-          <a:bodyPr>
-            <a:normAutofit fontScale="92500" lnSpcReduction="10000"/>
-          </a:bodyPr>
-          <a:lstStyle/>
-          <a:p>
-            <a:r>
-              <a:rPr lang="en-US" dirty="0" smtClean="0"/>
-              <a:t>We will develop test system and application models using our analysis techniques for which we can determine the predicted network resource requirements.</a:t>
-            </a:r>
-          </a:p>
-          <a:p>
-            <a:r>
-              <a:rPr lang="en-US" dirty="0" smtClean="0"/>
-              <a:t>We will develop those same test system and application models in RTC, using RTC Toolbox for MATLAB, for which we can determine comparison predicted network resource requirements.</a:t>
-            </a:r>
-          </a:p>
-          <a:p>
-            <a:r>
-              <a:rPr lang="en-US" dirty="0" smtClean="0"/>
-              <a:t>We will use our </a:t>
-            </a:r>
-            <a:r>
-              <a:rPr lang="en-US" dirty="0" err="1" smtClean="0"/>
-              <a:t>testbed</a:t>
-            </a:r>
-            <a:r>
-              <a:rPr lang="en-US" dirty="0" smtClean="0"/>
-              <a:t> to enforce the system profile and run application code which follows the network profile.  Measurement code on the </a:t>
-            </a:r>
-            <a:r>
-              <a:rPr lang="en-US" dirty="0" err="1" smtClean="0"/>
-              <a:t>testbed</a:t>
-            </a:r>
-            <a:r>
-              <a:rPr lang="en-US" dirty="0" smtClean="0"/>
-              <a:t> and in the application will allow us to determine the application's network buffer utilization and buffering delay.</a:t>
-            </a:r>
-          </a:p>
-          <a:p>
-            <a:r>
-              <a:rPr lang="en-US" dirty="0" smtClean="0"/>
-              <a:t>We will compare the predicted results for the test system and application combinations to see what, if any, difference exists between the techniques.</a:t>
-            </a:r>
-            <a:endParaRPr lang="en-US" dirty="0"/>
-          </a:p>
-        </p:txBody>
-      </p:sp>
-      <p:sp>
-        <p:nvSpPr>
-          <p:cNvPr id="4" name="Slide Number Placeholder 3"/>
-          <p:cNvSpPr>
-            <a:spLocks noGrp="1"/>
-          </p:cNvSpPr>
-          <p:nvPr>
-            <p:ph type="sldNum" sz="quarter" idx="12"/>
-          </p:nvPr>
-        </p:nvSpPr>
-        <p:spPr/>
-        <p:txBody>
-          <a:bodyPr/>
-          <a:lstStyle/>
-          <a:p>
-            <a:fld id="{4FAB73BC-B049-4115-A692-8D63A059BFB8}" type="slidenum">
-              <a:rPr lang="en-US" smtClean="0"/>
-              <a:t>24</a:t>
-            </a:fld>
-            <a:endParaRPr lang="en-US" dirty="0"/>
-          </a:p>
-        </p:txBody>
-      </p:sp>
-    </p:spTree>
-    <p:extLst>
-      <p:ext uri="{BB962C8B-B14F-4D97-AF65-F5344CB8AC3E}">
-        <p14:creationId xmlns:p14="http://schemas.microsoft.com/office/powerpoint/2010/main" val="1414555949"/>
       </p:ext>
     </p:extLst>
   </p:cSld>

</xml_diff>